<commit_message>
Subido Poster Científico Final
</commit_message>
<xml_diff>
--- a/Trabajos_teoricos/Trabajo_conceptual_2-Poster_científico/ISW_4K4_2022_Grupo_3_Trabajo_Conceptual_2_PosterCientifico-TestingAgil.pptx
+++ b/Trabajos_teoricos/Trabajo_conceptual_2-Poster_científico/ISW_4K4_2022_Grupo_3_Trabajo_Conceptual_2_PosterCientifico-TestingAgil.pptx
@@ -862,7 +862,7 @@
   <p:cSld>
     <p:spTree>
       <p:nvGrpSpPr>
-        <p:cNvPr id="103" name="Shape 103"/>
+        <p:cNvPr id="105" name="Shape 105"/>
         <p:cNvGrpSpPr/>
         <p:nvPr/>
       </p:nvGrpSpPr>
@@ -876,7 +876,7 @@
       </p:grpSpPr>
       <p:sp>
         <p:nvSpPr>
-          <p:cNvPr id="104" name="Google Shape;104;g135d5b30e5a_0_514:notes"/>
+          <p:cNvPr id="106" name="Google Shape;106;g120187825c5_0_0:notes"/>
           <p:cNvSpPr/>
           <p:nvPr>
             <p:ph idx="2" type="sldImg"/>
@@ -911,7 +911,7 @@
       </p:sp>
       <p:sp>
         <p:nvSpPr>
-          <p:cNvPr id="105" name="Google Shape;105;g135d5b30e5a_0_514:notes"/>
+          <p:cNvPr id="107" name="Google Shape;107;g120187825c5_0_0:notes"/>
           <p:cNvSpPr txBox="1"/>
           <p:nvPr>
             <p:ph idx="1" type="body"/>
@@ -961,7 +961,7 @@
   <p:cSld>
     <p:spTree>
       <p:nvGrpSpPr>
-        <p:cNvPr id="113" name="Shape 113"/>
+        <p:cNvPr id="110" name="Shape 110"/>
         <p:cNvGrpSpPr/>
         <p:nvPr/>
       </p:nvGrpSpPr>
@@ -975,7 +975,7 @@
       </p:grpSpPr>
       <p:sp>
         <p:nvSpPr>
-          <p:cNvPr id="114" name="Google Shape;114;g135d5b30e5a_0_537:notes"/>
+          <p:cNvPr id="111" name="Google Shape;111;g135d5b30e5a_0_514:notes"/>
           <p:cNvSpPr/>
           <p:nvPr>
             <p:ph idx="2" type="sldImg"/>
@@ -1010,7 +1010,7 @@
       </p:sp>
       <p:sp>
         <p:nvSpPr>
-          <p:cNvPr id="115" name="Google Shape;115;g135d5b30e5a_0_537:notes"/>
+          <p:cNvPr id="112" name="Google Shape;112;g135d5b30e5a_0_514:notes"/>
           <p:cNvSpPr txBox="1"/>
           <p:nvPr>
             <p:ph idx="1" type="body"/>
@@ -1060,7 +1060,7 @@
   <p:cSld>
     <p:spTree>
       <p:nvGrpSpPr>
-        <p:cNvPr id="141" name="Shape 141"/>
+        <p:cNvPr id="120" name="Shape 120"/>
         <p:cNvGrpSpPr/>
         <p:nvPr/>
       </p:nvGrpSpPr>
@@ -1074,7 +1074,7 @@
       </p:grpSpPr>
       <p:sp>
         <p:nvSpPr>
-          <p:cNvPr id="142" name="Google Shape;142;g134b64a880c_1_0:notes"/>
+          <p:cNvPr id="121" name="Google Shape;121;g135d5b30e5a_0_537:notes"/>
           <p:cNvSpPr/>
           <p:nvPr>
             <p:ph idx="2" type="sldImg"/>
@@ -1109,7 +1109,7 @@
       </p:sp>
       <p:sp>
         <p:nvSpPr>
-          <p:cNvPr id="143" name="Google Shape;143;g134b64a880c_1_0:notes"/>
+          <p:cNvPr id="122" name="Google Shape;122;g135d5b30e5a_0_537:notes"/>
           <p:cNvSpPr txBox="1"/>
           <p:nvPr>
             <p:ph idx="1" type="body"/>
@@ -6027,8 +6027,8 @@
         </p:nvSpPr>
         <p:spPr>
           <a:xfrm>
-            <a:off x="23208900" y="18096475"/>
-            <a:ext cx="6363300" cy="2325000"/>
+            <a:off x="23195250" y="13956900"/>
+            <a:ext cx="6363300" cy="923400"/>
           </a:xfrm>
           <a:prstGeom prst="roundRect">
             <a:avLst>
@@ -6054,6 +6054,35 @@
           </a:bodyPr>
           <a:lstStyle/>
           <a:p>
+            <a:pPr indent="0" lvl="0" marL="0" rtl="0" algn="ctr">
+              <a:spcBef>
+                <a:spcPts val="0"/>
+              </a:spcBef>
+              <a:spcAft>
+                <a:spcPts val="0"/>
+              </a:spcAft>
+              <a:buClr>
+                <a:schemeClr val="dk1"/>
+              </a:buClr>
+              <a:buSzPts val="1100"/>
+              <a:buFont typeface="Arial"/>
+              <a:buNone/>
+            </a:pPr>
+            <a:r>
+              <a:rPr lang="es" sz="3700">
+                <a:solidFill>
+                  <a:schemeClr val="dk1"/>
+                </a:solidFill>
+              </a:rPr>
+              <a:t>Referencias</a:t>
+            </a:r>
+            <a:endParaRPr sz="3700">
+              <a:solidFill>
+                <a:schemeClr val="dk1"/>
+              </a:solidFill>
+            </a:endParaRPr>
+          </a:p>
+          <a:p>
             <a:pPr indent="0" lvl="0" marL="0" rtl="0" algn="l">
               <a:spcBef>
                 <a:spcPts val="0"/>
@@ -6073,48 +6102,6 @@
       <p:sp>
         <p:nvSpPr>
           <p:cNvPr id="59" name="Google Shape;59;p13"/>
-          <p:cNvSpPr txBox="1"/>
-          <p:nvPr/>
-        </p:nvSpPr>
-        <p:spPr>
-          <a:xfrm>
-            <a:off x="24218850" y="18096475"/>
-            <a:ext cx="4343400" cy="754200"/>
-          </a:xfrm>
-          <a:prstGeom prst="rect">
-            <a:avLst/>
-          </a:prstGeom>
-          <a:noFill/>
-          <a:ln>
-            <a:noFill/>
-          </a:ln>
-        </p:spPr>
-        <p:txBody>
-          <a:bodyPr anchorCtr="0" anchor="t" bIns="91425" lIns="91425" spcFirstLastPara="1" rIns="91425" wrap="square" tIns="91425">
-            <a:spAutoFit/>
-          </a:bodyPr>
-          <a:lstStyle/>
-          <a:p>
-            <a:pPr indent="0" lvl="0" marL="0" rtl="0" algn="ctr">
-              <a:spcBef>
-                <a:spcPts val="0"/>
-              </a:spcBef>
-              <a:spcAft>
-                <a:spcPts val="0"/>
-              </a:spcAft>
-              <a:buNone/>
-            </a:pPr>
-            <a:r>
-              <a:rPr lang="es" sz="3700"/>
-              <a:t>Referencias</a:t>
-            </a:r>
-            <a:endParaRPr sz="3700"/>
-          </a:p>
-        </p:txBody>
-      </p:sp>
-      <p:sp>
-        <p:nvSpPr>
-          <p:cNvPr id="60" name="Google Shape;60;p13"/>
           <p:cNvSpPr txBox="1"/>
           <p:nvPr/>
         </p:nvSpPr>
@@ -6166,14 +6153,14 @@
       </p:sp>
       <p:sp>
         <p:nvSpPr>
-          <p:cNvPr id="61" name="Google Shape;61;p13"/>
+          <p:cNvPr id="60" name="Google Shape;60;p13"/>
           <p:cNvSpPr txBox="1"/>
           <p:nvPr/>
         </p:nvSpPr>
         <p:spPr>
           <a:xfrm>
             <a:off x="22955100" y="5237675"/>
-            <a:ext cx="6679800" cy="1290000"/>
+            <a:ext cx="6679800" cy="3591000"/>
           </a:xfrm>
           <a:prstGeom prst="rect">
             <a:avLst/>
@@ -6189,7 +6176,7 @@
           </a:bodyPr>
           <a:lstStyle/>
           <a:p>
-            <a:pPr indent="0" lvl="0" marL="0" rtl="0" algn="just">
+            <a:pPr indent="-393700" lvl="0" marL="457200" rtl="0" algn="just">
               <a:lnSpc>
                 <a:spcPct val="115000"/>
               </a:lnSpc>
@@ -6199,7 +6186,12 @@
               <a:spcAft>
                 <a:spcPts val="0"/>
               </a:spcAft>
-              <a:buNone/>
+              <a:buClr>
+                <a:schemeClr val="dk1"/>
+              </a:buClr>
+              <a:buSzPts val="2600"/>
+              <a:buFont typeface="Merriweather"/>
+              <a:buChar char="●"/>
             </a:pPr>
             <a:r>
               <a:rPr lang="es" sz="2600">
@@ -6211,7 +6203,87 @@
                 <a:cs typeface="Merriweather"/>
                 <a:sym typeface="Merriweather"/>
               </a:rPr>
-              <a:t>Se relaciona con los valores de, énfasis en individuos e i</a:t>
+              <a:t>Las mejores arquitecturas, diseños y requerimientos emergen de equipos autoorganizados</a:t>
+            </a:r>
+            <a:endParaRPr sz="2600">
+              <a:solidFill>
+                <a:schemeClr val="dk1"/>
+              </a:solidFill>
+              <a:latin typeface="Merriweather"/>
+              <a:ea typeface="Merriweather"/>
+              <a:cs typeface="Merriweather"/>
+              <a:sym typeface="Merriweather"/>
+            </a:endParaRPr>
+          </a:p>
+          <a:p>
+            <a:pPr indent="-393700" lvl="0" marL="457200" rtl="0" algn="just">
+              <a:lnSpc>
+                <a:spcPct val="115000"/>
+              </a:lnSpc>
+              <a:spcBef>
+                <a:spcPts val="0"/>
+              </a:spcBef>
+              <a:spcAft>
+                <a:spcPts val="0"/>
+              </a:spcAft>
+              <a:buClr>
+                <a:schemeClr val="dk1"/>
+              </a:buClr>
+              <a:buSzPts val="2600"/>
+              <a:buFont typeface="Merriweather"/>
+              <a:buChar char="●"/>
+            </a:pPr>
+            <a:r>
+              <a:rPr lang="es" sz="2600">
+                <a:solidFill>
+                  <a:schemeClr val="dk1"/>
+                </a:solidFill>
+                <a:latin typeface="Merriweather"/>
+                <a:ea typeface="Merriweather"/>
+                <a:cs typeface="Merriweather"/>
+                <a:sym typeface="Merriweather"/>
+              </a:rPr>
+              <a:t>La mejor métrica de progreso es la cantidad de software funcionando</a:t>
+            </a:r>
+            <a:endParaRPr sz="2600">
+              <a:solidFill>
+                <a:schemeClr val="dk1"/>
+              </a:solidFill>
+              <a:latin typeface="Merriweather"/>
+              <a:ea typeface="Merriweather"/>
+              <a:cs typeface="Merriweather"/>
+              <a:sym typeface="Merriweather"/>
+            </a:endParaRPr>
+          </a:p>
+          <a:p>
+            <a:pPr indent="-393700" lvl="0" marL="457200" rtl="0" algn="just">
+              <a:lnSpc>
+                <a:spcPct val="115000"/>
+              </a:lnSpc>
+              <a:spcBef>
+                <a:spcPts val="0"/>
+              </a:spcBef>
+              <a:spcAft>
+                <a:spcPts val="0"/>
+              </a:spcAft>
+              <a:buClr>
+                <a:schemeClr val="dk1"/>
+              </a:buClr>
+              <a:buSzPts val="2600"/>
+              <a:buFont typeface="Merriweather"/>
+              <a:buChar char="●"/>
+            </a:pPr>
+            <a:r>
+              <a:rPr lang="es" sz="2600">
+                <a:solidFill>
+                  <a:schemeClr val="dk1"/>
+                </a:solidFill>
+                <a:latin typeface="Merriweather"/>
+                <a:ea typeface="Merriweather"/>
+                <a:cs typeface="Merriweather"/>
+                <a:sym typeface="Merriweather"/>
+              </a:rPr>
+              <a:t>Técnicos y no técnicos trabajando juntos TODO el proyecto</a:t>
             </a:r>
             <a:endParaRPr sz="2600">
               <a:solidFill>
@@ -6258,14 +6330,14 @@
       </p:sp>
       <p:sp>
         <p:nvSpPr>
-          <p:cNvPr id="62" name="Google Shape;62;p13"/>
+          <p:cNvPr id="61" name="Google Shape;61;p13"/>
           <p:cNvSpPr txBox="1"/>
           <p:nvPr/>
         </p:nvSpPr>
         <p:spPr>
           <a:xfrm>
-            <a:off x="23208900" y="18856550"/>
-            <a:ext cx="6363300" cy="1385400"/>
+            <a:off x="23195250" y="14909675"/>
+            <a:ext cx="6363300" cy="2185800"/>
           </a:xfrm>
           <a:prstGeom prst="rect">
             <a:avLst/>
@@ -6335,11 +6407,93 @@
               <a:sym typeface="Merriweather"/>
             </a:endParaRPr>
           </a:p>
+          <a:p>
+            <a:pPr indent="-393700" lvl="0" marL="457200" rtl="0" algn="l">
+              <a:spcBef>
+                <a:spcPts val="0"/>
+              </a:spcBef>
+              <a:spcAft>
+                <a:spcPts val="0"/>
+              </a:spcAft>
+              <a:buSzPts val="2600"/>
+              <a:buFont typeface="Merriweather"/>
+              <a:buChar char="-"/>
+            </a:pPr>
+            <a:r>
+              <a:rPr lang="es" sz="2600" u="sng">
+                <a:solidFill>
+                  <a:schemeClr val="hlink"/>
+                </a:solidFill>
+                <a:latin typeface="Merriweather"/>
+                <a:ea typeface="Merriweather"/>
+                <a:cs typeface="Merriweather"/>
+                <a:sym typeface="Merriweather"/>
+                <a:hlinkClick r:id="rId3"/>
+              </a:rPr>
+              <a:t>https://testingmanifesto.com/</a:t>
+            </a:r>
+            <a:r>
+              <a:rPr lang="es" sz="2600">
+                <a:latin typeface="Merriweather"/>
+                <a:ea typeface="Merriweather"/>
+                <a:cs typeface="Merriweather"/>
+                <a:sym typeface="Merriweather"/>
+              </a:rPr>
+              <a:t> </a:t>
+            </a:r>
+            <a:endParaRPr sz="2600">
+              <a:latin typeface="Merriweather"/>
+              <a:ea typeface="Merriweather"/>
+              <a:cs typeface="Merriweather"/>
+              <a:sym typeface="Merriweather"/>
+            </a:endParaRPr>
+          </a:p>
+          <a:p>
+            <a:pPr indent="-393700" lvl="0" marL="457200" rtl="0" algn="l">
+              <a:spcBef>
+                <a:spcPts val="0"/>
+              </a:spcBef>
+              <a:spcAft>
+                <a:spcPts val="0"/>
+              </a:spcAft>
+              <a:buSzPts val="2600"/>
+              <a:buFont typeface="Merriweather"/>
+              <a:buChar char="-"/>
+            </a:pPr>
+            <a:r>
+              <a:rPr lang="es" sz="2600" u="sng">
+                <a:solidFill>
+                  <a:schemeClr val="hlink"/>
+                </a:solidFill>
+                <a:latin typeface="Merriweather"/>
+                <a:ea typeface="Merriweather"/>
+                <a:cs typeface="Merriweather"/>
+                <a:sym typeface="Merriweather"/>
+                <a:hlinkClick r:id="rId4"/>
+              </a:rPr>
+              <a:t>https://agilemanifesto.org/</a:t>
+            </a:r>
+            <a:r>
+              <a:rPr lang="es" sz="2600">
+                <a:latin typeface="Merriweather"/>
+                <a:ea typeface="Merriweather"/>
+                <a:cs typeface="Merriweather"/>
+                <a:sym typeface="Merriweather"/>
+              </a:rPr>
+              <a:t> </a:t>
+            </a:r>
+            <a:endParaRPr sz="2600">
+              <a:latin typeface="Merriweather"/>
+              <a:ea typeface="Merriweather"/>
+              <a:cs typeface="Merriweather"/>
+              <a:sym typeface="Merriweather"/>
+            </a:endParaRPr>
+          </a:p>
         </p:txBody>
       </p:sp>
       <p:sp>
         <p:nvSpPr>
-          <p:cNvPr id="63" name="Google Shape;63;p13"/>
+          <p:cNvPr id="62" name="Google Shape;62;p13"/>
           <p:cNvSpPr txBox="1"/>
           <p:nvPr/>
         </p:nvSpPr>
@@ -6392,7 +6546,7 @@
       </p:sp>
       <p:grpSp>
         <p:nvGrpSpPr>
-          <p:cNvPr id="64" name="Google Shape;64;p13"/>
+          <p:cNvPr id="63" name="Google Shape;63;p13"/>
           <p:cNvGrpSpPr/>
           <p:nvPr/>
         </p:nvGrpSpPr>
@@ -6406,7 +6560,7 @@
         </p:grpSpPr>
         <p:grpSp>
           <p:nvGrpSpPr>
-            <p:cNvPr id="65" name="Google Shape;65;p13"/>
+            <p:cNvPr id="64" name="Google Shape;64;p13"/>
             <p:cNvGrpSpPr/>
             <p:nvPr/>
           </p:nvGrpSpPr>
@@ -6420,7 +6574,7 @@
           </p:grpSpPr>
           <p:sp>
             <p:nvSpPr>
-              <p:cNvPr id="66" name="Google Shape;66;p13"/>
+              <p:cNvPr id="65" name="Google Shape;65;p13"/>
               <p:cNvSpPr/>
               <p:nvPr/>
             </p:nvSpPr>
@@ -6469,7 +6623,7 @@
           </p:sp>
           <p:sp>
             <p:nvSpPr>
-              <p:cNvPr id="67" name="Google Shape;67;p13"/>
+              <p:cNvPr id="66" name="Google Shape;66;p13"/>
               <p:cNvSpPr/>
               <p:nvPr/>
             </p:nvSpPr>
@@ -6518,7 +6672,7 @@
           </p:sp>
           <p:sp>
             <p:nvSpPr>
-              <p:cNvPr id="68" name="Google Shape;68;p13"/>
+              <p:cNvPr id="67" name="Google Shape;67;p13"/>
               <p:cNvSpPr/>
               <p:nvPr/>
             </p:nvSpPr>
@@ -6571,7 +6725,7 @@
           </p:sp>
           <p:sp>
             <p:nvSpPr>
-              <p:cNvPr id="69" name="Google Shape;69;p13"/>
+              <p:cNvPr id="68" name="Google Shape;68;p13"/>
               <p:cNvSpPr/>
               <p:nvPr/>
             </p:nvSpPr>
@@ -6625,7 +6779,7 @@
         </p:grpSp>
         <p:grpSp>
           <p:nvGrpSpPr>
-            <p:cNvPr id="70" name="Google Shape;70;p13"/>
+            <p:cNvPr id="69" name="Google Shape;69;p13"/>
             <p:cNvGrpSpPr/>
             <p:nvPr/>
           </p:nvGrpSpPr>
@@ -6639,7 +6793,7 @@
           </p:grpSpPr>
           <p:sp>
             <p:nvSpPr>
-              <p:cNvPr id="71" name="Google Shape;71;p13"/>
+              <p:cNvPr id="70" name="Google Shape;70;p13"/>
               <p:cNvSpPr/>
               <p:nvPr/>
             </p:nvSpPr>
@@ -6692,7 +6846,7 @@
           </p:sp>
           <p:sp>
             <p:nvSpPr>
-              <p:cNvPr id="72" name="Google Shape;72;p13"/>
+              <p:cNvPr id="71" name="Google Shape;71;p13"/>
               <p:cNvSpPr/>
               <p:nvPr/>
             </p:nvSpPr>
@@ -6741,7 +6895,7 @@
           </p:sp>
           <p:sp>
             <p:nvSpPr>
-              <p:cNvPr id="73" name="Google Shape;73;p13"/>
+              <p:cNvPr id="72" name="Google Shape;72;p13"/>
               <p:cNvSpPr/>
               <p:nvPr/>
             </p:nvSpPr>
@@ -6791,7 +6945,7 @@
         </p:grpSp>
         <p:grpSp>
           <p:nvGrpSpPr>
-            <p:cNvPr id="74" name="Google Shape;74;p13"/>
+            <p:cNvPr id="73" name="Google Shape;73;p13"/>
             <p:cNvGrpSpPr/>
             <p:nvPr/>
           </p:nvGrpSpPr>
@@ -6805,7 +6959,7 @@
           </p:grpSpPr>
           <p:sp>
             <p:nvSpPr>
-              <p:cNvPr id="75" name="Google Shape;75;p13"/>
+              <p:cNvPr id="74" name="Google Shape;74;p13"/>
               <p:cNvSpPr/>
               <p:nvPr/>
             </p:nvSpPr>
@@ -6854,7 +7008,7 @@
           </p:sp>
           <p:sp>
             <p:nvSpPr>
-              <p:cNvPr id="76" name="Google Shape;76;p13"/>
+              <p:cNvPr id="75" name="Google Shape;75;p13"/>
               <p:cNvSpPr/>
               <p:nvPr/>
             </p:nvSpPr>
@@ -6904,7 +7058,7 @@
         </p:grpSp>
         <p:grpSp>
           <p:nvGrpSpPr>
-            <p:cNvPr id="77" name="Google Shape;77;p13"/>
+            <p:cNvPr id="76" name="Google Shape;76;p13"/>
             <p:cNvGrpSpPr/>
             <p:nvPr/>
           </p:nvGrpSpPr>
@@ -6918,7 +7072,7 @@
           </p:grpSpPr>
           <p:sp>
             <p:nvSpPr>
-              <p:cNvPr id="78" name="Google Shape;78;p13"/>
+              <p:cNvPr id="77" name="Google Shape;77;p13"/>
               <p:cNvSpPr/>
               <p:nvPr/>
             </p:nvSpPr>
@@ -6967,7 +7121,7 @@
           </p:sp>
           <p:sp>
             <p:nvSpPr>
-              <p:cNvPr id="79" name="Google Shape;79;p13"/>
+              <p:cNvPr id="78" name="Google Shape;78;p13"/>
               <p:cNvSpPr/>
               <p:nvPr/>
             </p:nvSpPr>
@@ -7016,7 +7170,7 @@
           </p:sp>
           <p:sp>
             <p:nvSpPr>
-              <p:cNvPr id="80" name="Google Shape;80;p13"/>
+              <p:cNvPr id="79" name="Google Shape;79;p13"/>
               <p:cNvSpPr/>
               <p:nvPr/>
             </p:nvSpPr>
@@ -7068,7 +7222,7 @@
         </p:grpSp>
         <p:sp>
           <p:nvSpPr>
-            <p:cNvPr id="81" name="Google Shape;81;p13"/>
+            <p:cNvPr id="80" name="Google Shape;80;p13"/>
             <p:cNvSpPr txBox="1"/>
             <p:nvPr/>
           </p:nvSpPr>
@@ -7111,7 +7265,7 @@
       </p:grpSp>
       <p:sp>
         <p:nvSpPr>
-          <p:cNvPr id="82" name="Google Shape;82;p13"/>
+          <p:cNvPr id="81" name="Google Shape;81;p13"/>
           <p:cNvSpPr/>
           <p:nvPr/>
         </p:nvSpPr>
@@ -7163,14 +7317,14 @@
       </p:sp>
       <p:sp>
         <p:nvSpPr>
-          <p:cNvPr id="83" name="Google Shape;83;p13"/>
+          <p:cNvPr id="82" name="Google Shape;82;p13"/>
           <p:cNvSpPr/>
           <p:nvPr/>
         </p:nvSpPr>
         <p:spPr>
           <a:xfrm>
-            <a:off x="761100" y="7478350"/>
-            <a:ext cx="6516000" cy="7499700"/>
+            <a:off x="762900" y="7478350"/>
+            <a:ext cx="6679800" cy="7499700"/>
           </a:xfrm>
           <a:prstGeom prst="verticalScroll">
             <a:avLst>
@@ -7249,7 +7403,7 @@
             </a:endParaRPr>
           </a:p>
           <a:p>
-            <a:pPr indent="-393700" lvl="0" marL="457200" rtl="0" algn="just">
+            <a:pPr indent="-393700" lvl="0" marL="457200" rtl="0" algn="l">
               <a:spcBef>
                 <a:spcPts val="0"/>
               </a:spcBef>
@@ -7273,7 +7427,7 @@
                 <a:cs typeface="Merriweather"/>
                 <a:sym typeface="Merriweather"/>
               </a:rPr>
-              <a:t>Individuos e interacciones sobre procesos y herramientas</a:t>
+              <a:t>Individuos e interacciones sobre procesos y  herramientas</a:t>
             </a:r>
             <a:endParaRPr sz="2600">
               <a:solidFill>
@@ -7286,7 +7440,7 @@
             </a:endParaRPr>
           </a:p>
           <a:p>
-            <a:pPr indent="-393700" lvl="0" marL="457200" rtl="0" algn="just">
+            <a:pPr indent="-393700" lvl="0" marL="457200" rtl="0" algn="l">
               <a:spcBef>
                 <a:spcPts val="0"/>
               </a:spcBef>
@@ -7323,7 +7477,7 @@
             </a:endParaRPr>
           </a:p>
           <a:p>
-            <a:pPr indent="-393700" lvl="0" marL="457200" rtl="0" algn="just">
+            <a:pPr indent="-393700" lvl="0" marL="457200" rtl="0" algn="l">
               <a:spcBef>
                 <a:spcPts val="0"/>
               </a:spcBef>
@@ -7360,7 +7514,7 @@
             </a:endParaRPr>
           </a:p>
           <a:p>
-            <a:pPr indent="-393700" lvl="0" marL="457200" rtl="0" algn="just">
+            <a:pPr indent="-393700" lvl="0" marL="457200" rtl="0" algn="l">
               <a:spcBef>
                 <a:spcPts val="0"/>
               </a:spcBef>
@@ -7400,7 +7554,7 @@
       </p:sp>
       <p:sp>
         <p:nvSpPr>
-          <p:cNvPr id="84" name="Google Shape;84;p13"/>
+          <p:cNvPr id="83" name="Google Shape;83;p13"/>
           <p:cNvSpPr/>
           <p:nvPr/>
         </p:nvSpPr>
@@ -7475,7 +7629,7 @@
       </p:sp>
       <p:sp>
         <p:nvSpPr>
-          <p:cNvPr id="85" name="Google Shape;85;p13"/>
+          <p:cNvPr id="84" name="Google Shape;84;p13"/>
           <p:cNvSpPr/>
           <p:nvPr/>
         </p:nvSpPr>
@@ -7582,7 +7736,7 @@
       </p:sp>
       <p:sp>
         <p:nvSpPr>
-          <p:cNvPr id="86" name="Google Shape;86;p13"/>
+          <p:cNvPr id="85" name="Google Shape;85;p13"/>
           <p:cNvSpPr/>
           <p:nvPr/>
         </p:nvSpPr>
@@ -7657,7 +7811,7 @@
       </p:sp>
       <p:sp>
         <p:nvSpPr>
-          <p:cNvPr id="87" name="Google Shape;87;p13"/>
+          <p:cNvPr id="86" name="Google Shape;86;p13"/>
           <p:cNvSpPr/>
           <p:nvPr/>
         </p:nvSpPr>
@@ -7732,7 +7886,7 @@
       </p:sp>
       <p:sp>
         <p:nvSpPr>
-          <p:cNvPr id="88" name="Google Shape;88;p13"/>
+          <p:cNvPr id="87" name="Google Shape;87;p13"/>
           <p:cNvSpPr/>
           <p:nvPr/>
         </p:nvSpPr>
@@ -7807,7 +7961,7 @@
       </p:sp>
       <p:sp>
         <p:nvSpPr>
-          <p:cNvPr id="89" name="Google Shape;89;p13"/>
+          <p:cNvPr id="88" name="Google Shape;88;p13"/>
           <p:cNvSpPr txBox="1"/>
           <p:nvPr/>
         </p:nvSpPr>
@@ -7881,7 +8035,7 @@
       </p:sp>
       <p:sp>
         <p:nvSpPr>
-          <p:cNvPr id="90" name="Google Shape;90;p13"/>
+          <p:cNvPr id="89" name="Google Shape;89;p13"/>
           <p:cNvSpPr txBox="1"/>
           <p:nvPr/>
         </p:nvSpPr>
@@ -7933,7 +8087,7 @@
       </p:sp>
       <p:sp>
         <p:nvSpPr>
-          <p:cNvPr id="91" name="Google Shape;91;p13"/>
+          <p:cNvPr id="90" name="Google Shape;90;p13"/>
           <p:cNvSpPr txBox="1"/>
           <p:nvPr/>
         </p:nvSpPr>
@@ -7985,7 +8139,7 @@
       </p:sp>
       <p:sp>
         <p:nvSpPr>
-          <p:cNvPr id="92" name="Google Shape;92;p13"/>
+          <p:cNvPr id="91" name="Google Shape;91;p13"/>
           <p:cNvSpPr txBox="1"/>
           <p:nvPr/>
         </p:nvSpPr>
@@ -8037,7 +8191,7 @@
       </p:sp>
       <p:sp>
         <p:nvSpPr>
-          <p:cNvPr id="93" name="Google Shape;93;p13"/>
+          <p:cNvPr id="92" name="Google Shape;92;p13"/>
           <p:cNvSpPr txBox="1"/>
           <p:nvPr/>
         </p:nvSpPr>
@@ -8089,7 +8243,7 @@
       </p:sp>
       <p:sp>
         <p:nvSpPr>
-          <p:cNvPr id="94" name="Google Shape;94;p13"/>
+          <p:cNvPr id="93" name="Google Shape;93;p13"/>
           <p:cNvSpPr txBox="1"/>
           <p:nvPr/>
         </p:nvSpPr>
@@ -8135,7 +8289,7 @@
       </p:sp>
       <p:sp>
         <p:nvSpPr>
-          <p:cNvPr id="95" name="Google Shape;95;p13"/>
+          <p:cNvPr id="94" name="Google Shape;94;p13"/>
           <p:cNvSpPr txBox="1"/>
           <p:nvPr/>
         </p:nvSpPr>
@@ -8187,13 +8341,13 @@
       </p:sp>
       <p:sp>
         <p:nvSpPr>
-          <p:cNvPr id="96" name="Google Shape;96;p13"/>
+          <p:cNvPr id="95" name="Google Shape;95;p13"/>
           <p:cNvSpPr/>
           <p:nvPr/>
         </p:nvSpPr>
         <p:spPr>
           <a:xfrm>
-            <a:off x="22966200" y="8439075"/>
+            <a:off x="22966200" y="8896275"/>
             <a:ext cx="6516000" cy="754200"/>
           </a:xfrm>
           <a:prstGeom prst="roundRect">
@@ -8239,13 +8393,13 @@
       </p:sp>
       <p:sp>
         <p:nvSpPr>
-          <p:cNvPr id="97" name="Google Shape;97;p13"/>
+          <p:cNvPr id="96" name="Google Shape;96;p13"/>
           <p:cNvSpPr txBox="1"/>
           <p:nvPr/>
         </p:nvSpPr>
         <p:spPr>
           <a:xfrm>
-            <a:off x="23037000" y="9307140"/>
+            <a:off x="23037000" y="9688140"/>
             <a:ext cx="6679800" cy="4186800"/>
           </a:xfrm>
           <a:prstGeom prst="rect">
@@ -8262,7 +8416,7 @@
           </a:bodyPr>
           <a:lstStyle/>
           <a:p>
-            <a:pPr indent="-393700" lvl="0" marL="457200" rtl="0" algn="l">
+            <a:pPr indent="-393700" lvl="0" marL="457200" rtl="0" algn="just">
               <a:spcBef>
                 <a:spcPts val="0"/>
               </a:spcBef>
@@ -8290,7 +8444,7 @@
             </a:endParaRPr>
           </a:p>
           <a:p>
-            <a:pPr indent="-393700" lvl="0" marL="457200" rtl="0" algn="l">
+            <a:pPr indent="-393700" lvl="0" marL="457200" rtl="0" algn="just">
               <a:spcBef>
                 <a:spcPts val="0"/>
               </a:spcBef>
@@ -8318,7 +8472,7 @@
             </a:endParaRPr>
           </a:p>
           <a:p>
-            <a:pPr indent="-393700" lvl="0" marL="457200" rtl="0" algn="l">
+            <a:pPr indent="-393700" lvl="0" marL="457200" rtl="0" algn="just">
               <a:spcBef>
                 <a:spcPts val="0"/>
               </a:spcBef>
@@ -8346,7 +8500,7 @@
             </a:endParaRPr>
           </a:p>
           <a:p>
-            <a:pPr indent="-393700" lvl="0" marL="457200" rtl="0" algn="l">
+            <a:pPr indent="-393700" lvl="0" marL="457200" rtl="0" algn="just">
               <a:spcBef>
                 <a:spcPts val="0"/>
               </a:spcBef>
@@ -8375,50 +8529,23 @@
           </a:p>
         </p:txBody>
       </p:sp>
-      <p:pic>
-        <p:nvPicPr>
-          <p:cNvPr id="98" name="Google Shape;98;p13"/>
-          <p:cNvPicPr preferRelativeResize="0"/>
-          <p:nvPr/>
-        </p:nvPicPr>
-        <p:blipFill rotWithShape="1">
-          <a:blip r:embed="rId3">
-            <a:alphaModFix/>
-          </a:blip>
-          <a:srcRect b="7617" l="6289" r="8942" t="8207"/>
-          <a:stretch/>
-        </p:blipFill>
-        <p:spPr>
-          <a:xfrm>
-            <a:off x="24520525" y="13880700"/>
-            <a:ext cx="3548950" cy="3524213"/>
-          </a:xfrm>
-          <a:prstGeom prst="rect">
-            <a:avLst/>
-          </a:prstGeom>
-          <a:noFill/>
-          <a:ln>
-            <a:noFill/>
-          </a:ln>
-        </p:spPr>
-      </p:pic>
       <p:grpSp>
         <p:nvGrpSpPr>
-          <p:cNvPr id="99" name="Google Shape;99;p13"/>
+          <p:cNvPr id="97" name="Google Shape;97;p13"/>
           <p:cNvGrpSpPr/>
           <p:nvPr/>
         </p:nvGrpSpPr>
         <p:grpSpPr>
           <a:xfrm>
             <a:off x="952125" y="15518650"/>
-            <a:ext cx="6324975" cy="4829625"/>
+            <a:ext cx="6324975" cy="4843250"/>
             <a:chOff x="952125" y="15518650"/>
-            <a:chExt cx="6324975" cy="4829625"/>
+            <a:chExt cx="6324975" cy="4843250"/>
           </a:xfrm>
         </p:grpSpPr>
         <p:sp>
           <p:nvSpPr>
-            <p:cNvPr id="100" name="Google Shape;100;p13"/>
+            <p:cNvPr id="98" name="Google Shape;98;p13"/>
             <p:cNvSpPr/>
             <p:nvPr/>
           </p:nvSpPr>
@@ -8462,7 +8589,7 @@
         </p:sp>
         <p:sp>
           <p:nvSpPr>
-            <p:cNvPr id="101" name="Google Shape;101;p13"/>
+            <p:cNvPr id="99" name="Google Shape;99;p13"/>
             <p:cNvSpPr/>
             <p:nvPr/>
           </p:nvSpPr>
@@ -8506,13 +8633,13 @@
         </p:sp>
         <p:sp>
           <p:nvSpPr>
-            <p:cNvPr id="102" name="Google Shape;102;p13"/>
+            <p:cNvPr id="100" name="Google Shape;100;p13"/>
             <p:cNvSpPr/>
             <p:nvPr/>
           </p:nvSpPr>
           <p:spPr>
             <a:xfrm>
-              <a:off x="2659650" y="17762275"/>
+              <a:off x="2782950" y="17775900"/>
               <a:ext cx="2639700" cy="2586000"/>
             </a:xfrm>
             <a:prstGeom prst="ellipse">
@@ -8548,7 +8675,176 @@
             </a:p>
           </p:txBody>
         </p:sp>
+        <p:sp>
+          <p:nvSpPr>
+            <p:cNvPr id="101" name="Google Shape;101;p13"/>
+            <p:cNvSpPr/>
+            <p:nvPr/>
+          </p:nvSpPr>
+          <p:spPr>
+            <a:xfrm>
+              <a:off x="3855900" y="15518655"/>
+              <a:ext cx="3421200" cy="3365700"/>
+            </a:xfrm>
+            <a:prstGeom prst="ellipse">
+              <a:avLst/>
+            </a:prstGeom>
+            <a:noFill/>
+            <a:ln cap="flat" cmpd="sng" w="38100">
+              <a:solidFill>
+                <a:schemeClr val="dk1"/>
+              </a:solidFill>
+              <a:prstDash val="solid"/>
+              <a:round/>
+              <a:headEnd len="sm" w="sm" type="none"/>
+              <a:tailEnd len="sm" w="sm" type="none"/>
+            </a:ln>
+          </p:spPr>
+          <p:txBody>
+            <a:bodyPr anchorCtr="0" anchor="ctr" bIns="91425" lIns="91425" spcFirstLastPara="1" rIns="91425" wrap="square" tIns="91425">
+              <a:noAutofit/>
+            </a:bodyPr>
+            <a:lstStyle/>
+            <a:p>
+              <a:pPr indent="0" lvl="0" marL="0" rtl="0" algn="ctr">
+                <a:spcBef>
+                  <a:spcPts val="0"/>
+                </a:spcBef>
+                <a:spcAft>
+                  <a:spcPts val="0"/>
+                </a:spcAft>
+                <a:buNone/>
+              </a:pPr>
+              <a:r>
+                <a:t/>
+              </a:r>
+              <a:endParaRPr sz="3200"/>
+            </a:p>
+          </p:txBody>
+        </p:sp>
+        <p:sp>
+          <p:nvSpPr>
+            <p:cNvPr id="102" name="Google Shape;102;p13"/>
+            <p:cNvSpPr/>
+            <p:nvPr/>
+          </p:nvSpPr>
+          <p:spPr>
+            <a:xfrm>
+              <a:off x="952125" y="15518650"/>
+              <a:ext cx="3421200" cy="3365700"/>
+            </a:xfrm>
+            <a:prstGeom prst="ellipse">
+              <a:avLst/>
+            </a:prstGeom>
+            <a:noFill/>
+            <a:ln cap="flat" cmpd="sng" w="38100">
+              <a:solidFill>
+                <a:schemeClr val="dk1"/>
+              </a:solidFill>
+              <a:prstDash val="solid"/>
+              <a:round/>
+              <a:headEnd len="sm" w="sm" type="none"/>
+              <a:tailEnd len="sm" w="sm" type="none"/>
+            </a:ln>
+          </p:spPr>
+          <p:txBody>
+            <a:bodyPr anchorCtr="0" anchor="ctr" bIns="91425" lIns="91425" spcFirstLastPara="1" rIns="91425" wrap="square" tIns="91425">
+              <a:noAutofit/>
+            </a:bodyPr>
+            <a:lstStyle/>
+            <a:p>
+              <a:pPr indent="0" lvl="0" marL="0" rtl="0" algn="ctr">
+                <a:spcBef>
+                  <a:spcPts val="0"/>
+                </a:spcBef>
+                <a:spcAft>
+                  <a:spcPts val="0"/>
+                </a:spcAft>
+                <a:buNone/>
+              </a:pPr>
+              <a:r>
+                <a:t/>
+              </a:r>
+              <a:endParaRPr sz="3000"/>
+            </a:p>
+          </p:txBody>
+        </p:sp>
+        <p:sp>
+          <p:nvSpPr>
+            <p:cNvPr id="103" name="Google Shape;103;p13"/>
+            <p:cNvSpPr/>
+            <p:nvPr/>
+          </p:nvSpPr>
+          <p:spPr>
+            <a:xfrm>
+              <a:off x="2782950" y="17775900"/>
+              <a:ext cx="2639700" cy="2586000"/>
+            </a:xfrm>
+            <a:prstGeom prst="ellipse">
+              <a:avLst/>
+            </a:prstGeom>
+            <a:noFill/>
+            <a:ln cap="flat" cmpd="sng" w="38100">
+              <a:solidFill>
+                <a:schemeClr val="dk1"/>
+              </a:solidFill>
+              <a:prstDash val="solid"/>
+              <a:round/>
+              <a:headEnd len="sm" w="sm" type="none"/>
+              <a:tailEnd len="sm" w="sm" type="none"/>
+            </a:ln>
+          </p:spPr>
+          <p:txBody>
+            <a:bodyPr anchorCtr="0" anchor="ctr" bIns="91425" lIns="91425" spcFirstLastPara="1" rIns="91425" wrap="square" tIns="91425">
+              <a:noAutofit/>
+            </a:bodyPr>
+            <a:lstStyle/>
+            <a:p>
+              <a:pPr indent="0" lvl="0" marL="0" rtl="0" algn="ctr">
+                <a:spcBef>
+                  <a:spcPts val="0"/>
+                </a:spcBef>
+                <a:spcAft>
+                  <a:spcPts val="0"/>
+                </a:spcAft>
+                <a:buNone/>
+              </a:pPr>
+              <a:r>
+                <a:t/>
+              </a:r>
+              <a:endParaRPr sz="3700"/>
+            </a:p>
+          </p:txBody>
+        </p:sp>
       </p:grpSp>
+      <p:pic>
+        <p:nvPicPr>
+          <p:cNvPr id="104" name="Google Shape;104;p13"/>
+          <p:cNvPicPr preferRelativeResize="0"/>
+          <p:nvPr/>
+        </p:nvPicPr>
+        <p:blipFill>
+          <a:blip r:embed="rId5">
+            <a:alphaModFix/>
+          </a:blip>
+          <a:stretch>
+            <a:fillRect/>
+          </a:stretch>
+        </p:blipFill>
+        <p:spPr>
+          <a:xfrm>
+            <a:off x="24707675" y="17166000"/>
+            <a:ext cx="3484850" cy="3484850"/>
+          </a:xfrm>
+          <a:prstGeom prst="rect">
+            <a:avLst/>
+          </a:prstGeom>
+          <a:noFill/>
+          <a:ln>
+            <a:noFill/>
+          </a:ln>
+        </p:spPr>
+      </p:pic>
     </p:spTree>
   </p:cSld>
   <p:clrMapOvr>
@@ -8562,7 +8858,7 @@
   <p:cSld>
     <p:spTree>
       <p:nvGrpSpPr>
-        <p:cNvPr id="106" name="Shape 106"/>
+        <p:cNvPr id="108" name="Shape 108"/>
         <p:cNvGrpSpPr/>
         <p:nvPr/>
       </p:nvGrpSpPr>
@@ -8576,7 +8872,72 @@
       </p:grpSpPr>
       <p:sp>
         <p:nvSpPr>
-          <p:cNvPr id="107" name="Google Shape;107;p14"/>
+          <p:cNvPr id="109" name="Google Shape;109;p14"/>
+          <p:cNvSpPr txBox="1"/>
+          <p:nvPr>
+            <p:ph type="ctrTitle"/>
+          </p:nvPr>
+        </p:nvSpPr>
+        <p:spPr>
+          <a:xfrm>
+            <a:off x="1032074" y="3095556"/>
+            <a:ext cx="28211700" cy="8533800"/>
+          </a:xfrm>
+          <a:prstGeom prst="rect">
+            <a:avLst/>
+          </a:prstGeom>
+        </p:spPr>
+        <p:txBody>
+          <a:bodyPr anchorCtr="0" anchor="b" bIns="321925" lIns="321925" spcFirstLastPara="1" rIns="321925" wrap="square" tIns="321925">
+            <a:normAutofit/>
+          </a:bodyPr>
+          <a:lstStyle/>
+          <a:p>
+            <a:pPr indent="0" lvl="0" marL="0" rtl="0" algn="ctr">
+              <a:spcBef>
+                <a:spcPts val="0"/>
+              </a:spcBef>
+              <a:spcAft>
+                <a:spcPts val="0"/>
+              </a:spcAft>
+              <a:buNone/>
+            </a:pPr>
+            <a:r>
+              <a:rPr lang="es"/>
+              <a:t>Lo que sigue es Material de Apoyo</a:t>
+            </a:r>
+            <a:endParaRPr/>
+          </a:p>
+        </p:txBody>
+      </p:sp>
+    </p:spTree>
+  </p:cSld>
+  <p:clrMapOvr>
+    <a:masterClrMapping/>
+  </p:clrMapOvr>
+</p:sld>
+</file>
+
+<file path=ppt/slides/slide3.xml><?xml version="1.0" encoding="utf-8"?>
+<p:sld xmlns:a="http://schemas.openxmlformats.org/drawingml/2006/main" xmlns:r="http://schemas.openxmlformats.org/officeDocument/2006/relationships" xmlns:mc="http://schemas.openxmlformats.org/markup-compatibility/2006" xmlns:mv="urn:schemas-microsoft-com:mac:vml" xmlns:p="http://schemas.openxmlformats.org/presentationml/2006/main" xmlns:c="http://schemas.openxmlformats.org/drawingml/2006/chart" xmlns:dgm="http://schemas.openxmlformats.org/drawingml/2006/diagram" xmlns:o="urn:schemas-microsoft-com:office:office" xmlns:v="urn:schemas-microsoft-com:vml" xmlns:pvml="urn:schemas-microsoft-com:office:powerpoint" xmlns:com="http://schemas.openxmlformats.org/drawingml/2006/compatibility" xmlns:p14="http://schemas.microsoft.com/office/powerpoint/2010/main" xmlns:p15="http://schemas.microsoft.com/office/powerpoint/2012/main" xmlns:ahyp="http://schemas.microsoft.com/office/drawing/2018/hyperlinkcolor">
+  <p:cSld>
+    <p:spTree>
+      <p:nvGrpSpPr>
+        <p:cNvPr id="113" name="Shape 113"/>
+        <p:cNvGrpSpPr/>
+        <p:nvPr/>
+      </p:nvGrpSpPr>
+      <p:grpSpPr>
+        <a:xfrm>
+          <a:off x="0" y="0"/>
+          <a:ext cx="0" cy="0"/>
+          <a:chOff x="0" y="0"/>
+          <a:chExt cx="0" cy="0"/>
+        </a:xfrm>
+      </p:grpSpPr>
+      <p:sp>
+        <p:nvSpPr>
+          <p:cNvPr id="114" name="Google Shape;114;p15"/>
           <p:cNvSpPr txBox="1"/>
           <p:nvPr>
             <p:ph type="title"/>
@@ -8616,7 +8977,7 @@
       </p:sp>
       <p:pic>
         <p:nvPicPr>
-          <p:cNvPr id="108" name="Google Shape;108;p14"/>
+          <p:cNvPr id="115" name="Google Shape;115;p15"/>
           <p:cNvPicPr preferRelativeResize="0"/>
           <p:nvPr/>
         </p:nvPicPr>
@@ -8630,8 +8991,8 @@
         </p:blipFill>
         <p:spPr>
           <a:xfrm>
-            <a:off x="1062876" y="3416852"/>
-            <a:ext cx="13613550" cy="9267899"/>
+            <a:off x="0" y="1816650"/>
+            <a:ext cx="14604151" cy="9942285"/>
           </a:xfrm>
           <a:prstGeom prst="rect">
             <a:avLst/>
@@ -8644,7 +9005,7 @@
       </p:pic>
       <p:pic>
         <p:nvPicPr>
-          <p:cNvPr id="109" name="Google Shape;109;p14"/>
+          <p:cNvPr id="116" name="Google Shape;116;p15"/>
           <p:cNvPicPr preferRelativeResize="0"/>
           <p:nvPr/>
         </p:nvPicPr>
@@ -8658,8 +9019,8 @@
         </p:blipFill>
         <p:spPr>
           <a:xfrm>
-            <a:off x="15225575" y="10951200"/>
-            <a:ext cx="14808026" cy="9736149"/>
+            <a:off x="14604150" y="11079892"/>
+            <a:ext cx="15671850" cy="10304107"/>
           </a:xfrm>
           <a:prstGeom prst="rect">
             <a:avLst/>
@@ -8672,7 +9033,7 @@
       </p:pic>
       <p:pic>
         <p:nvPicPr>
-          <p:cNvPr id="110" name="Google Shape;110;p14"/>
+          <p:cNvPr id="117" name="Google Shape;117;p15"/>
           <p:cNvPicPr preferRelativeResize="0"/>
           <p:nvPr/>
         </p:nvPicPr>
@@ -8686,7 +9047,7 @@
         </p:blipFill>
         <p:spPr>
           <a:xfrm>
-            <a:off x="14676426" y="5498100"/>
+            <a:off x="20360476" y="5586600"/>
             <a:ext cx="9915525" cy="5105400"/>
           </a:xfrm>
           <a:prstGeom prst="rect">
@@ -8700,7 +9061,7 @@
       </p:pic>
       <p:pic>
         <p:nvPicPr>
-          <p:cNvPr id="111" name="Google Shape;111;p14"/>
+          <p:cNvPr id="118" name="Google Shape;118;p15"/>
           <p:cNvPicPr preferRelativeResize="0"/>
           <p:nvPr/>
         </p:nvPicPr>
@@ -8714,8 +9075,8 @@
         </p:blipFill>
         <p:spPr>
           <a:xfrm>
-            <a:off x="457200" y="12684749"/>
-            <a:ext cx="13249923" cy="7850200"/>
+            <a:off x="0" y="11758925"/>
+            <a:ext cx="14604149" cy="8652539"/>
           </a:xfrm>
           <a:prstGeom prst="rect">
             <a:avLst/>
@@ -8728,7 +9089,7 @@
       </p:pic>
       <p:pic>
         <p:nvPicPr>
-          <p:cNvPr id="112" name="Google Shape;112;p14"/>
+          <p:cNvPr id="119" name="Google Shape;119;p15"/>
           <p:cNvPicPr preferRelativeResize="0"/>
           <p:nvPr/>
         </p:nvPicPr>
@@ -8742,8 +9103,8 @@
         </p:blipFill>
         <p:spPr>
           <a:xfrm>
-            <a:off x="22067825" y="476100"/>
-            <a:ext cx="6408300" cy="4674300"/>
+            <a:off x="22616969" y="0"/>
+            <a:ext cx="7659031" cy="5586600"/>
           </a:xfrm>
           <a:prstGeom prst="rect">
             <a:avLst/>
@@ -8762,12 +9123,12 @@
 </p:sld>
 </file>
 
-<file path=ppt/slides/slide3.xml><?xml version="1.0" encoding="utf-8"?>
+<file path=ppt/slides/slide4.xml><?xml version="1.0" encoding="utf-8"?>
 <p:sld xmlns:a="http://schemas.openxmlformats.org/drawingml/2006/main" xmlns:r="http://schemas.openxmlformats.org/officeDocument/2006/relationships" xmlns:mc="http://schemas.openxmlformats.org/markup-compatibility/2006" xmlns:mv="urn:schemas-microsoft-com:mac:vml" xmlns:p="http://schemas.openxmlformats.org/presentationml/2006/main" xmlns:c="http://schemas.openxmlformats.org/drawingml/2006/chart" xmlns:dgm="http://schemas.openxmlformats.org/drawingml/2006/diagram" xmlns:o="urn:schemas-microsoft-com:office:office" xmlns:v="urn:schemas-microsoft-com:vml" xmlns:pvml="urn:schemas-microsoft-com:office:powerpoint" xmlns:com="http://schemas.openxmlformats.org/drawingml/2006/compatibility" xmlns:p14="http://schemas.microsoft.com/office/powerpoint/2010/main" xmlns:p15="http://schemas.microsoft.com/office/powerpoint/2012/main" xmlns:ahyp="http://schemas.microsoft.com/office/drawing/2018/hyperlinkcolor">
   <p:cSld>
     <p:spTree>
       <p:nvGrpSpPr>
-        <p:cNvPr id="116" name="Shape 116"/>
+        <p:cNvPr id="123" name="Shape 123"/>
         <p:cNvGrpSpPr/>
         <p:nvPr/>
       </p:nvGrpSpPr>
@@ -8781,7 +9142,7 @@
       </p:grpSpPr>
       <p:pic>
         <p:nvPicPr>
-          <p:cNvPr id="117" name="Google Shape;117;p15"/>
+          <p:cNvPr id="124" name="Google Shape;124;p16"/>
           <p:cNvPicPr preferRelativeResize="0"/>
           <p:nvPr/>
         </p:nvPicPr>
@@ -8809,7 +9170,7 @@
       </p:pic>
       <p:pic>
         <p:nvPicPr>
-          <p:cNvPr id="118" name="Google Shape;118;p15"/>
+          <p:cNvPr id="125" name="Google Shape;125;p16"/>
           <p:cNvPicPr preferRelativeResize="0"/>
           <p:nvPr/>
         </p:nvPicPr>
@@ -8823,7 +9184,7 @@
         </p:blipFill>
         <p:spPr>
           <a:xfrm>
-            <a:off x="19989000" y="0"/>
+            <a:off x="12901122" y="0"/>
             <a:ext cx="10287000" cy="13143149"/>
           </a:xfrm>
           <a:prstGeom prst="rect">
@@ -8837,7 +9198,7 @@
       </p:pic>
       <p:pic>
         <p:nvPicPr>
-          <p:cNvPr id="119" name="Google Shape;119;p15"/>
+          <p:cNvPr id="126" name="Google Shape;126;p16"/>
           <p:cNvPicPr preferRelativeResize="0"/>
           <p:nvPr/>
         </p:nvPicPr>
@@ -8865,7 +9226,7 @@
       </p:pic>
       <p:pic>
         <p:nvPicPr>
-          <p:cNvPr id="120" name="Google Shape;120;p15"/>
+          <p:cNvPr id="127" name="Google Shape;127;p16"/>
           <p:cNvPicPr preferRelativeResize="0"/>
           <p:nvPr/>
         </p:nvPicPr>
@@ -8879,7 +9240,7 @@
         </p:blipFill>
         <p:spPr>
           <a:xfrm>
-            <a:off x="2493513" y="15517825"/>
+            <a:off x="540000" y="14389788"/>
             <a:ext cx="7924800" cy="1600200"/>
           </a:xfrm>
           <a:prstGeom prst="rect">
@@ -8893,13 +9254,13 @@
       </p:pic>
       <p:grpSp>
         <p:nvGrpSpPr>
-          <p:cNvPr id="121" name="Google Shape;121;p15"/>
+          <p:cNvPr id="128" name="Google Shape;128;p16"/>
           <p:cNvGrpSpPr/>
           <p:nvPr/>
         </p:nvGrpSpPr>
         <p:grpSpPr>
           <a:xfrm>
-            <a:off x="1119825" y="16984675"/>
+            <a:off x="540000" y="16222425"/>
             <a:ext cx="5062500" cy="2733525"/>
             <a:chOff x="1119825" y="16984675"/>
             <a:chExt cx="5062500" cy="2733525"/>
@@ -8907,7 +9268,7 @@
         </p:grpSpPr>
         <p:grpSp>
           <p:nvGrpSpPr>
-            <p:cNvPr id="122" name="Google Shape;122;p15"/>
+            <p:cNvPr id="129" name="Google Shape;129;p16"/>
             <p:cNvGrpSpPr/>
             <p:nvPr/>
           </p:nvGrpSpPr>
@@ -8921,7 +9282,7 @@
           </p:grpSpPr>
           <p:sp>
             <p:nvSpPr>
-              <p:cNvPr id="123" name="Google Shape;123;p15"/>
+              <p:cNvPr id="130" name="Google Shape;130;p16"/>
               <p:cNvSpPr/>
               <p:nvPr/>
             </p:nvSpPr>
@@ -8970,7 +9331,7 @@
           </p:sp>
           <p:sp>
             <p:nvSpPr>
-              <p:cNvPr id="124" name="Google Shape;124;p15"/>
+              <p:cNvPr id="131" name="Google Shape;131;p16"/>
               <p:cNvSpPr/>
               <p:nvPr/>
             </p:nvSpPr>
@@ -9019,7 +9380,7 @@
           </p:sp>
           <p:sp>
             <p:nvSpPr>
-              <p:cNvPr id="125" name="Google Shape;125;p15"/>
+              <p:cNvPr id="132" name="Google Shape;132;p16"/>
               <p:cNvSpPr/>
               <p:nvPr/>
             </p:nvSpPr>
@@ -9072,7 +9433,7 @@
           </p:sp>
           <p:sp>
             <p:nvSpPr>
-              <p:cNvPr id="126" name="Google Shape;126;p15"/>
+              <p:cNvPr id="133" name="Google Shape;133;p16"/>
               <p:cNvSpPr/>
               <p:nvPr/>
             </p:nvSpPr>
@@ -9126,7 +9487,7 @@
         </p:grpSp>
         <p:grpSp>
           <p:nvGrpSpPr>
-            <p:cNvPr id="127" name="Google Shape;127;p15"/>
+            <p:cNvPr id="134" name="Google Shape;134;p16"/>
             <p:cNvGrpSpPr/>
             <p:nvPr/>
           </p:nvGrpSpPr>
@@ -9140,7 +9501,7 @@
           </p:grpSpPr>
           <p:sp>
             <p:nvSpPr>
-              <p:cNvPr id="128" name="Google Shape;128;p15"/>
+              <p:cNvPr id="135" name="Google Shape;135;p16"/>
               <p:cNvSpPr/>
               <p:nvPr/>
             </p:nvSpPr>
@@ -9193,7 +9554,7 @@
           </p:sp>
           <p:sp>
             <p:nvSpPr>
-              <p:cNvPr id="129" name="Google Shape;129;p15"/>
+              <p:cNvPr id="136" name="Google Shape;136;p16"/>
               <p:cNvSpPr/>
               <p:nvPr/>
             </p:nvSpPr>
@@ -9242,7 +9603,7 @@
           </p:sp>
           <p:sp>
             <p:nvSpPr>
-              <p:cNvPr id="130" name="Google Shape;130;p15"/>
+              <p:cNvPr id="137" name="Google Shape;137;p16"/>
               <p:cNvSpPr/>
               <p:nvPr/>
             </p:nvSpPr>
@@ -9292,7 +9653,7 @@
         </p:grpSp>
         <p:grpSp>
           <p:nvGrpSpPr>
-            <p:cNvPr id="131" name="Google Shape;131;p15"/>
+            <p:cNvPr id="138" name="Google Shape;138;p16"/>
             <p:cNvGrpSpPr/>
             <p:nvPr/>
           </p:nvGrpSpPr>
@@ -9306,7 +9667,7 @@
           </p:grpSpPr>
           <p:sp>
             <p:nvSpPr>
-              <p:cNvPr id="132" name="Google Shape;132;p15"/>
+              <p:cNvPr id="139" name="Google Shape;139;p16"/>
               <p:cNvSpPr/>
               <p:nvPr/>
             </p:nvSpPr>
@@ -9355,7 +9716,7 @@
           </p:sp>
           <p:sp>
             <p:nvSpPr>
-              <p:cNvPr id="133" name="Google Shape;133;p15"/>
+              <p:cNvPr id="140" name="Google Shape;140;p16"/>
               <p:cNvSpPr/>
               <p:nvPr/>
             </p:nvSpPr>
@@ -9405,7 +9766,7 @@
         </p:grpSp>
         <p:grpSp>
           <p:nvGrpSpPr>
-            <p:cNvPr id="134" name="Google Shape;134;p15"/>
+            <p:cNvPr id="141" name="Google Shape;141;p16"/>
             <p:cNvGrpSpPr/>
             <p:nvPr/>
           </p:nvGrpSpPr>
@@ -9419,7 +9780,7 @@
           </p:grpSpPr>
           <p:sp>
             <p:nvSpPr>
-              <p:cNvPr id="135" name="Google Shape;135;p15"/>
+              <p:cNvPr id="142" name="Google Shape;142;p16"/>
               <p:cNvSpPr/>
               <p:nvPr/>
             </p:nvSpPr>
@@ -9468,7 +9829,7 @@
           </p:sp>
           <p:sp>
             <p:nvSpPr>
-              <p:cNvPr id="136" name="Google Shape;136;p15"/>
+              <p:cNvPr id="143" name="Google Shape;143;p16"/>
               <p:cNvSpPr/>
               <p:nvPr/>
             </p:nvSpPr>
@@ -9517,7 +9878,7 @@
           </p:sp>
           <p:sp>
             <p:nvSpPr>
-              <p:cNvPr id="137" name="Google Shape;137;p15"/>
+              <p:cNvPr id="144" name="Google Shape;144;p16"/>
               <p:cNvSpPr/>
               <p:nvPr/>
             </p:nvSpPr>
@@ -9569,7 +9930,7 @@
         </p:grpSp>
         <p:sp>
           <p:nvSpPr>
-            <p:cNvPr id="138" name="Google Shape;138;p15"/>
+            <p:cNvPr id="145" name="Google Shape;145;p16"/>
             <p:cNvSpPr txBox="1"/>
             <p:nvPr/>
           </p:nvSpPr>
@@ -9612,14 +9973,14 @@
       </p:grpSp>
       <p:sp>
         <p:nvSpPr>
-          <p:cNvPr id="139" name="Google Shape;139;p15"/>
+          <p:cNvPr id="146" name="Google Shape;146;p16"/>
           <p:cNvSpPr txBox="1"/>
           <p:nvPr/>
         </p:nvSpPr>
         <p:spPr>
           <a:xfrm>
-            <a:off x="16978950" y="13605475"/>
-            <a:ext cx="11347200" cy="3140100"/>
+            <a:off x="9566850" y="14767650"/>
+            <a:ext cx="17248500" cy="2154900"/>
           </a:xfrm>
           <a:prstGeom prst="rect">
             <a:avLst/>
@@ -9732,7 +10093,7 @@
       </p:sp>
       <p:pic>
         <p:nvPicPr>
-          <p:cNvPr id="140" name="Google Shape;140;p15"/>
+          <p:cNvPr id="147" name="Google Shape;147;p16"/>
           <p:cNvPicPr preferRelativeResize="0"/>
           <p:nvPr/>
         </p:nvPicPr>
@@ -9746,8 +10107,8 @@
         </p:blipFill>
         <p:spPr>
           <a:xfrm>
-            <a:off x="19609527" y="17703625"/>
-            <a:ext cx="5480050" cy="3497899"/>
+            <a:off x="23188125" y="0"/>
+            <a:ext cx="7087874" cy="4524170"/>
           </a:xfrm>
           <a:prstGeom prst="rect">
             <a:avLst/>
@@ -9766,907 +10127,286 @@
 </p:sld>
 </file>
 
-<file path=ppt/slides/slide4.xml><?xml version="1.0" encoding="utf-8"?>
-<p:sld xmlns:a="http://schemas.openxmlformats.org/drawingml/2006/main" xmlns:r="http://schemas.openxmlformats.org/officeDocument/2006/relationships" xmlns:mc="http://schemas.openxmlformats.org/markup-compatibility/2006" xmlns:mv="urn:schemas-microsoft-com:mac:vml" xmlns:p="http://schemas.openxmlformats.org/presentationml/2006/main" xmlns:c="http://schemas.openxmlformats.org/drawingml/2006/chart" xmlns:dgm="http://schemas.openxmlformats.org/drawingml/2006/diagram" xmlns:o="urn:schemas-microsoft-com:office:office" xmlns:v="urn:schemas-microsoft-com:vml" xmlns:pvml="urn:schemas-microsoft-com:office:powerpoint" xmlns:com="http://schemas.openxmlformats.org/drawingml/2006/compatibility" xmlns:p14="http://schemas.microsoft.com/office/powerpoint/2010/main" xmlns:p15="http://schemas.microsoft.com/office/powerpoint/2012/main" xmlns:ahyp="http://schemas.microsoft.com/office/drawing/2018/hyperlinkcolor">
-  <p:cSld>
-    <p:spTree>
-      <p:nvGrpSpPr>
-        <p:cNvPr id="144" name="Shape 144"/>
-        <p:cNvGrpSpPr/>
-        <p:nvPr/>
-      </p:nvGrpSpPr>
-      <p:grpSpPr>
-        <a:xfrm>
-          <a:off x="0" y="0"/>
-          <a:ext cx="0" cy="0"/>
-          <a:chOff x="0" y="0"/>
-          <a:chExt cx="0" cy="0"/>
-        </a:xfrm>
-      </p:grpSpPr>
-      <p:sp>
-        <p:nvSpPr>
-          <p:cNvPr id="145" name="Google Shape;145;p16"/>
-          <p:cNvSpPr txBox="1"/>
-          <p:nvPr>
-            <p:ph type="title"/>
-          </p:nvPr>
-        </p:nvSpPr>
-        <p:spPr>
-          <a:xfrm>
-            <a:off x="1032046" y="1850183"/>
-            <a:ext cx="28211700" cy="2381100"/>
-          </a:xfrm>
-          <a:prstGeom prst="rect">
-            <a:avLst/>
-          </a:prstGeom>
-        </p:spPr>
-        <p:txBody>
-          <a:bodyPr anchorCtr="0" anchor="t" bIns="321925" lIns="321925" spcFirstLastPara="1" rIns="321925" wrap="square" tIns="321925">
-            <a:normAutofit/>
-          </a:bodyPr>
-          <a:lstStyle/>
-          <a:p>
-            <a:pPr indent="0" lvl="0" marL="0" rtl="0" algn="l">
-              <a:spcBef>
-                <a:spcPts val="0"/>
-              </a:spcBef>
-              <a:spcAft>
-                <a:spcPts val="0"/>
-              </a:spcAft>
-              <a:buNone/>
-            </a:pPr>
-            <a:r>
-              <a:t/>
-            </a:r>
-            <a:endParaRPr/>
-          </a:p>
-        </p:txBody>
-      </p:sp>
-      <p:sp>
-        <p:nvSpPr>
-          <p:cNvPr id="146" name="Google Shape;146;p16"/>
-          <p:cNvSpPr txBox="1"/>
-          <p:nvPr>
-            <p:ph idx="1" type="body"/>
-          </p:nvPr>
-        </p:nvSpPr>
-        <p:spPr>
-          <a:xfrm>
-            <a:off x="1032046" y="4791392"/>
-            <a:ext cx="28211700" cy="14203800"/>
-          </a:xfrm>
-          <a:prstGeom prst="rect">
-            <a:avLst/>
-          </a:prstGeom>
-        </p:spPr>
-        <p:txBody>
-          <a:bodyPr anchorCtr="0" anchor="t" bIns="321925" lIns="321925" spcFirstLastPara="1" rIns="321925" wrap="square" tIns="321925">
-            <a:normAutofit/>
-          </a:bodyPr>
-          <a:lstStyle/>
-          <a:p>
-            <a:pPr indent="-393700" lvl="0" marL="457200" rtl="0" algn="just">
-              <a:lnSpc>
-                <a:spcPct val="100000"/>
-              </a:lnSpc>
-              <a:spcBef>
-                <a:spcPts val="0"/>
-              </a:spcBef>
-              <a:spcAft>
-                <a:spcPts val="0"/>
-              </a:spcAft>
-              <a:buClr>
-                <a:schemeClr val="dk1"/>
-              </a:buClr>
-              <a:buSzPts val="2600"/>
-              <a:buFont typeface="Merriweather"/>
-              <a:buChar char="●"/>
-            </a:pPr>
-            <a:r>
-              <a:rPr lang="es" sz="3400">
-                <a:solidFill>
-                  <a:schemeClr val="dk1"/>
-                </a:solidFill>
-                <a:latin typeface="Merriweather"/>
-                <a:ea typeface="Merriweather"/>
-                <a:cs typeface="Merriweather"/>
-                <a:sym typeface="Merriweather"/>
-              </a:rPr>
-              <a:t>Individuos e interacciones</a:t>
-            </a:r>
-            <a:r>
-              <a:rPr lang="es" sz="2600">
-                <a:solidFill>
-                  <a:schemeClr val="dk1"/>
-                </a:solidFill>
-                <a:latin typeface="Merriweather"/>
-                <a:ea typeface="Merriweather"/>
-                <a:cs typeface="Merriweather"/>
-                <a:sym typeface="Merriweather"/>
-              </a:rPr>
-              <a:t> sobre procesos y herramientas</a:t>
-            </a:r>
-            <a:endParaRPr sz="2600">
-              <a:solidFill>
-                <a:schemeClr val="dk1"/>
-              </a:solidFill>
-              <a:latin typeface="Merriweather"/>
-              <a:ea typeface="Merriweather"/>
-              <a:cs typeface="Merriweather"/>
-              <a:sym typeface="Merriweather"/>
-            </a:endParaRPr>
-          </a:p>
-          <a:p>
-            <a:pPr indent="-393700" lvl="0" marL="457200" rtl="0" algn="just">
-              <a:lnSpc>
-                <a:spcPct val="100000"/>
-              </a:lnSpc>
-              <a:spcBef>
-                <a:spcPts val="0"/>
-              </a:spcBef>
-              <a:spcAft>
-                <a:spcPts val="0"/>
-              </a:spcAft>
-              <a:buClr>
-                <a:schemeClr val="dk1"/>
-              </a:buClr>
-              <a:buSzPts val="2600"/>
-              <a:buFont typeface="Merriweather"/>
-              <a:buChar char="●"/>
-            </a:pPr>
-            <a:r>
-              <a:rPr lang="es" sz="3400">
-                <a:solidFill>
-                  <a:schemeClr val="dk1"/>
-                </a:solidFill>
-                <a:latin typeface="Merriweather"/>
-                <a:ea typeface="Merriweather"/>
-                <a:cs typeface="Merriweather"/>
-                <a:sym typeface="Merriweather"/>
-              </a:rPr>
-              <a:t>Software funcionando</a:t>
-            </a:r>
-            <a:r>
-              <a:rPr lang="es" sz="2600">
-                <a:solidFill>
-                  <a:schemeClr val="dk1"/>
-                </a:solidFill>
-                <a:latin typeface="Merriweather"/>
-                <a:ea typeface="Merriweather"/>
-                <a:cs typeface="Merriweather"/>
-                <a:sym typeface="Merriweather"/>
-              </a:rPr>
-              <a:t> sobre documentación extensiva</a:t>
-            </a:r>
-            <a:endParaRPr sz="2600">
-              <a:solidFill>
-                <a:schemeClr val="dk1"/>
-              </a:solidFill>
-              <a:latin typeface="Merriweather"/>
-              <a:ea typeface="Merriweather"/>
-              <a:cs typeface="Merriweather"/>
-              <a:sym typeface="Merriweather"/>
-            </a:endParaRPr>
-          </a:p>
-          <a:p>
-            <a:pPr indent="-393700" lvl="0" marL="457200" rtl="0" algn="just">
-              <a:lnSpc>
-                <a:spcPct val="100000"/>
-              </a:lnSpc>
-              <a:spcBef>
-                <a:spcPts val="0"/>
-              </a:spcBef>
-              <a:spcAft>
-                <a:spcPts val="0"/>
-              </a:spcAft>
-              <a:buClr>
-                <a:schemeClr val="dk1"/>
-              </a:buClr>
-              <a:buSzPts val="2600"/>
-              <a:buFont typeface="Merriweather"/>
-              <a:buChar char="●"/>
-            </a:pPr>
-            <a:r>
-              <a:rPr lang="es" sz="3400">
-                <a:solidFill>
-                  <a:schemeClr val="dk1"/>
-                </a:solidFill>
-                <a:latin typeface="Merriweather"/>
-                <a:ea typeface="Merriweather"/>
-                <a:cs typeface="Merriweather"/>
-                <a:sym typeface="Merriweather"/>
-              </a:rPr>
-              <a:t>Colaboración con el cliente</a:t>
-            </a:r>
-            <a:r>
-              <a:rPr lang="es" sz="2600">
-                <a:solidFill>
-                  <a:schemeClr val="dk1"/>
-                </a:solidFill>
-                <a:latin typeface="Merriweather"/>
-                <a:ea typeface="Merriweather"/>
-                <a:cs typeface="Merriweather"/>
-                <a:sym typeface="Merriweather"/>
-              </a:rPr>
-              <a:t> sobre negociación contractual</a:t>
-            </a:r>
-            <a:endParaRPr sz="3400">
-              <a:solidFill>
-                <a:schemeClr val="dk1"/>
-              </a:solidFill>
-              <a:latin typeface="Merriweather"/>
-              <a:ea typeface="Merriweather"/>
-              <a:cs typeface="Merriweather"/>
-              <a:sym typeface="Merriweather"/>
-            </a:endParaRPr>
-          </a:p>
-          <a:p>
-            <a:pPr indent="-393700" lvl="0" marL="457200" rtl="0" algn="just">
-              <a:lnSpc>
-                <a:spcPct val="100000"/>
-              </a:lnSpc>
-              <a:spcBef>
-                <a:spcPts val="0"/>
-              </a:spcBef>
-              <a:spcAft>
-                <a:spcPts val="0"/>
-              </a:spcAft>
-              <a:buClr>
-                <a:schemeClr val="dk1"/>
-              </a:buClr>
-              <a:buSzPts val="2600"/>
-              <a:buFont typeface="Merriweather"/>
-              <a:buChar char="●"/>
-            </a:pPr>
-            <a:r>
-              <a:rPr lang="es" sz="3400">
-                <a:solidFill>
-                  <a:schemeClr val="dk1"/>
-                </a:solidFill>
-                <a:latin typeface="Merriweather"/>
-                <a:ea typeface="Merriweather"/>
-                <a:cs typeface="Merriweather"/>
-                <a:sym typeface="Merriweather"/>
-              </a:rPr>
-              <a:t>Respuesta ante el cambio</a:t>
-            </a:r>
-            <a:r>
-              <a:rPr lang="es" sz="2600">
-                <a:solidFill>
-                  <a:schemeClr val="dk1"/>
-                </a:solidFill>
-                <a:latin typeface="Merriweather"/>
-                <a:ea typeface="Merriweather"/>
-                <a:cs typeface="Merriweather"/>
-                <a:sym typeface="Merriweather"/>
-              </a:rPr>
-              <a:t> sobre seguir un plan</a:t>
-            </a:r>
-            <a:endParaRPr sz="3400">
-              <a:solidFill>
-                <a:schemeClr val="dk1"/>
-              </a:solidFill>
-              <a:latin typeface="Merriweather"/>
-              <a:ea typeface="Merriweather"/>
-              <a:cs typeface="Merriweather"/>
-              <a:sym typeface="Merriweather"/>
-            </a:endParaRPr>
-          </a:p>
-          <a:p>
-            <a:pPr indent="0" lvl="0" marL="0" rtl="0" algn="just">
-              <a:lnSpc>
-                <a:spcPct val="100000"/>
-              </a:lnSpc>
-              <a:spcBef>
-                <a:spcPts val="0"/>
-              </a:spcBef>
-              <a:spcAft>
-                <a:spcPts val="0"/>
-              </a:spcAft>
-              <a:buNone/>
-            </a:pPr>
-            <a:r>
-              <a:t/>
-            </a:r>
-            <a:endParaRPr sz="2600">
-              <a:solidFill>
-                <a:schemeClr val="dk1"/>
-              </a:solidFill>
-              <a:latin typeface="Merriweather"/>
-              <a:ea typeface="Merriweather"/>
-              <a:cs typeface="Merriweather"/>
-              <a:sym typeface="Merriweather"/>
-            </a:endParaRPr>
-          </a:p>
-          <a:p>
-            <a:pPr indent="0" lvl="0" marL="0" rtl="0" algn="just">
-              <a:lnSpc>
-                <a:spcPct val="100000"/>
-              </a:lnSpc>
-              <a:spcBef>
-                <a:spcPts val="0"/>
-              </a:spcBef>
-              <a:spcAft>
-                <a:spcPts val="0"/>
-              </a:spcAft>
-              <a:buNone/>
-            </a:pPr>
-            <a:r>
-              <a:t/>
-            </a:r>
-            <a:endParaRPr sz="2600">
-              <a:solidFill>
-                <a:schemeClr val="dk1"/>
-              </a:solidFill>
-              <a:latin typeface="Merriweather"/>
-              <a:ea typeface="Merriweather"/>
-              <a:cs typeface="Merriweather"/>
-              <a:sym typeface="Merriweather"/>
-            </a:endParaRPr>
-          </a:p>
-          <a:p>
-            <a:pPr indent="0" lvl="0" marL="0" rtl="0" algn="just">
-              <a:lnSpc>
-                <a:spcPct val="100000"/>
-              </a:lnSpc>
-              <a:spcBef>
-                <a:spcPts val="0"/>
-              </a:spcBef>
-              <a:spcAft>
-                <a:spcPts val="0"/>
-              </a:spcAft>
-              <a:buNone/>
-            </a:pPr>
-            <a:r>
-              <a:t/>
-            </a:r>
-            <a:endParaRPr sz="2600">
-              <a:solidFill>
-                <a:schemeClr val="dk1"/>
-              </a:solidFill>
-              <a:latin typeface="Merriweather"/>
-              <a:ea typeface="Merriweather"/>
-              <a:cs typeface="Merriweather"/>
-              <a:sym typeface="Merriweather"/>
-            </a:endParaRPr>
-          </a:p>
-          <a:p>
-            <a:pPr indent="0" lvl="0" marL="0" rtl="0" algn="just">
-              <a:lnSpc>
-                <a:spcPct val="100000"/>
-              </a:lnSpc>
-              <a:spcBef>
-                <a:spcPts val="0"/>
-              </a:spcBef>
-              <a:spcAft>
-                <a:spcPts val="0"/>
-              </a:spcAft>
-              <a:buNone/>
-            </a:pPr>
-            <a:r>
-              <a:t/>
-            </a:r>
-            <a:endParaRPr sz="2600">
-              <a:solidFill>
-                <a:schemeClr val="dk1"/>
-              </a:solidFill>
-              <a:latin typeface="Merriweather"/>
-              <a:ea typeface="Merriweather"/>
-              <a:cs typeface="Merriweather"/>
-              <a:sym typeface="Merriweather"/>
-            </a:endParaRPr>
-          </a:p>
-          <a:p>
-            <a:pPr indent="0" lvl="0" marL="0" rtl="0" algn="just">
-              <a:lnSpc>
-                <a:spcPct val="100000"/>
-              </a:lnSpc>
-              <a:spcBef>
-                <a:spcPts val="0"/>
-              </a:spcBef>
-              <a:spcAft>
-                <a:spcPts val="0"/>
-              </a:spcAft>
-              <a:buNone/>
-            </a:pPr>
-            <a:r>
-              <a:rPr lang="es" sz="2600">
-                <a:solidFill>
-                  <a:schemeClr val="dk1"/>
-                </a:solidFill>
-                <a:latin typeface="Merriweather"/>
-                <a:ea typeface="Merriweather"/>
-                <a:cs typeface="Merriweather"/>
-                <a:sym typeface="Merriweather"/>
-              </a:rPr>
-              <a:t>Tesing</a:t>
-            </a:r>
-            <a:endParaRPr sz="2600">
-              <a:solidFill>
-                <a:schemeClr val="dk1"/>
-              </a:solidFill>
-              <a:latin typeface="Merriweather"/>
-              <a:ea typeface="Merriweather"/>
-              <a:cs typeface="Merriweather"/>
-              <a:sym typeface="Merriweather"/>
-            </a:endParaRPr>
-          </a:p>
-          <a:p>
-            <a:pPr indent="-393700" lvl="0" marL="457200" rtl="0" algn="l">
-              <a:lnSpc>
-                <a:spcPct val="100000"/>
-              </a:lnSpc>
-              <a:spcBef>
-                <a:spcPts val="0"/>
-              </a:spcBef>
-              <a:spcAft>
-                <a:spcPts val="0"/>
-              </a:spcAft>
-              <a:buClr>
-                <a:schemeClr val="dk1"/>
-              </a:buClr>
-              <a:buSzPts val="2600"/>
-              <a:buFont typeface="Merriweather"/>
-              <a:buChar char="●"/>
-            </a:pPr>
-            <a:r>
-              <a:rPr lang="es" sz="3400">
-                <a:solidFill>
-                  <a:schemeClr val="dk1"/>
-                </a:solidFill>
-                <a:latin typeface="Merriweather"/>
-                <a:ea typeface="Merriweather"/>
-                <a:cs typeface="Merriweather"/>
-                <a:sym typeface="Merriweather"/>
-              </a:rPr>
-              <a:t>Testing durante el proyecto por sobre testing al final</a:t>
-            </a:r>
-            <a:endParaRPr sz="3400">
-              <a:solidFill>
-                <a:schemeClr val="dk1"/>
-              </a:solidFill>
-              <a:latin typeface="Merriweather"/>
-              <a:ea typeface="Merriweather"/>
-              <a:cs typeface="Merriweather"/>
-              <a:sym typeface="Merriweather"/>
-            </a:endParaRPr>
-          </a:p>
-          <a:p>
-            <a:pPr indent="-393700" lvl="0" marL="457200" rtl="0" algn="l">
-              <a:lnSpc>
-                <a:spcPct val="100000"/>
-              </a:lnSpc>
-              <a:spcBef>
-                <a:spcPts val="0"/>
-              </a:spcBef>
-              <a:spcAft>
-                <a:spcPts val="0"/>
-              </a:spcAft>
-              <a:buClr>
-                <a:schemeClr val="dk1"/>
-              </a:buClr>
-              <a:buSzPts val="2600"/>
-              <a:buFont typeface="Merriweather"/>
-              <a:buChar char="●"/>
-            </a:pPr>
-            <a:r>
-              <a:rPr lang="es" sz="3400">
-                <a:solidFill>
-                  <a:schemeClr val="dk1"/>
-                </a:solidFill>
-                <a:latin typeface="Merriweather"/>
-                <a:ea typeface="Merriweather"/>
-                <a:cs typeface="Merriweather"/>
-                <a:sym typeface="Merriweather"/>
-              </a:rPr>
-              <a:t>Prevenir bugs</a:t>
-            </a:r>
-            <a:r>
-              <a:rPr lang="es" sz="2600">
-                <a:solidFill>
-                  <a:schemeClr val="dk1"/>
-                </a:solidFill>
-                <a:latin typeface="Merriweather"/>
-                <a:ea typeface="Merriweather"/>
-                <a:cs typeface="Merriweather"/>
-                <a:sym typeface="Merriweather"/>
-              </a:rPr>
-              <a:t> sobre encontrarlos</a:t>
-            </a:r>
-            <a:endParaRPr sz="2600">
-              <a:solidFill>
-                <a:schemeClr val="dk1"/>
-              </a:solidFill>
-              <a:latin typeface="Merriweather"/>
-              <a:ea typeface="Merriweather"/>
-              <a:cs typeface="Merriweather"/>
-              <a:sym typeface="Merriweather"/>
-            </a:endParaRPr>
-          </a:p>
-          <a:p>
-            <a:pPr indent="-393700" lvl="0" marL="457200" rtl="0" algn="l">
-              <a:lnSpc>
-                <a:spcPct val="100000"/>
-              </a:lnSpc>
-              <a:spcBef>
-                <a:spcPts val="0"/>
-              </a:spcBef>
-              <a:spcAft>
-                <a:spcPts val="0"/>
-              </a:spcAft>
-              <a:buClr>
-                <a:schemeClr val="dk1"/>
-              </a:buClr>
-              <a:buSzPts val="2600"/>
-              <a:buFont typeface="Merriweather"/>
-              <a:buChar char="●"/>
-            </a:pPr>
-            <a:r>
-              <a:rPr lang="es" sz="3400">
-                <a:solidFill>
-                  <a:schemeClr val="dk1"/>
-                </a:solidFill>
-                <a:latin typeface="Merriweather"/>
-                <a:ea typeface="Merriweather"/>
-                <a:cs typeface="Merriweather"/>
-                <a:sym typeface="Merriweather"/>
-              </a:rPr>
-              <a:t>Construir el mejor sistema </a:t>
-            </a:r>
-            <a:r>
-              <a:rPr lang="es" sz="2600">
-                <a:solidFill>
-                  <a:schemeClr val="dk1"/>
-                </a:solidFill>
-                <a:latin typeface="Merriweather"/>
-                <a:ea typeface="Merriweather"/>
-                <a:cs typeface="Merriweather"/>
-                <a:sym typeface="Merriweather"/>
-              </a:rPr>
-              <a:t>sobre romper el sistema</a:t>
-            </a:r>
-            <a:endParaRPr sz="2600">
-              <a:solidFill>
-                <a:schemeClr val="dk1"/>
-              </a:solidFill>
-              <a:latin typeface="Merriweather"/>
-              <a:ea typeface="Merriweather"/>
-              <a:cs typeface="Merriweather"/>
-              <a:sym typeface="Merriweather"/>
-            </a:endParaRPr>
-          </a:p>
-          <a:p>
-            <a:pPr indent="-393700" lvl="0" marL="457200" rtl="0" algn="l">
-              <a:lnSpc>
-                <a:spcPct val="100000"/>
-              </a:lnSpc>
-              <a:spcBef>
-                <a:spcPts val="0"/>
-              </a:spcBef>
-              <a:spcAft>
-                <a:spcPts val="0"/>
-              </a:spcAft>
-              <a:buClr>
-                <a:schemeClr val="dk1"/>
-              </a:buClr>
-              <a:buSzPts val="2600"/>
-              <a:buFont typeface="Merriweather"/>
-              <a:buChar char="●"/>
-            </a:pPr>
-            <a:r>
-              <a:rPr lang="es" sz="3400">
-                <a:solidFill>
-                  <a:schemeClr val="dk1"/>
-                </a:solidFill>
-                <a:latin typeface="Merriweather"/>
-                <a:ea typeface="Merriweather"/>
-                <a:cs typeface="Merriweather"/>
-                <a:sym typeface="Merriweather"/>
-              </a:rPr>
-              <a:t>Responsabilidad colectiva para la calidad </a:t>
-            </a:r>
-            <a:r>
-              <a:rPr lang="es" sz="2600">
-                <a:solidFill>
-                  <a:schemeClr val="dk1"/>
-                </a:solidFill>
-                <a:latin typeface="Merriweather"/>
-                <a:ea typeface="Merriweather"/>
-                <a:cs typeface="Merriweather"/>
-                <a:sym typeface="Merriweather"/>
-              </a:rPr>
-              <a:t>sobre responsabilidad individual</a:t>
-            </a:r>
-            <a:endParaRPr sz="2600">
-              <a:solidFill>
-                <a:schemeClr val="dk1"/>
-              </a:solidFill>
-              <a:latin typeface="Merriweather"/>
-              <a:ea typeface="Merriweather"/>
-              <a:cs typeface="Merriweather"/>
-              <a:sym typeface="Merriweather"/>
-            </a:endParaRPr>
-          </a:p>
-          <a:p>
-            <a:pPr indent="-393700" lvl="0" marL="457200" rtl="0" algn="just">
-              <a:lnSpc>
-                <a:spcPct val="100000"/>
-              </a:lnSpc>
-              <a:spcBef>
-                <a:spcPts val="0"/>
-              </a:spcBef>
-              <a:spcAft>
-                <a:spcPts val="0"/>
-              </a:spcAft>
-              <a:buClr>
-                <a:schemeClr val="dk1"/>
-              </a:buClr>
-              <a:buSzPts val="2600"/>
-              <a:buFont typeface="Merriweather"/>
-              <a:buChar char="●"/>
-            </a:pPr>
-            <a:r>
-              <a:t/>
-            </a:r>
-            <a:endParaRPr sz="2600">
-              <a:solidFill>
-                <a:schemeClr val="dk1"/>
-              </a:solidFill>
-              <a:latin typeface="Merriweather"/>
-              <a:ea typeface="Merriweather"/>
-              <a:cs typeface="Merriweather"/>
-              <a:sym typeface="Merriweather"/>
-            </a:endParaRPr>
-          </a:p>
-          <a:p>
-            <a:pPr indent="0" lvl="0" marL="0" rtl="0" algn="l">
-              <a:spcBef>
-                <a:spcPts val="0"/>
-              </a:spcBef>
-              <a:spcAft>
-                <a:spcPts val="4200"/>
-              </a:spcAft>
-              <a:buNone/>
-            </a:pPr>
-            <a:r>
-              <a:t/>
-            </a:r>
-            <a:endParaRPr/>
-          </a:p>
-        </p:txBody>
-      </p:sp>
-      <p:sp>
-        <p:nvSpPr>
-          <p:cNvPr id="147" name="Google Shape;147;p16"/>
-          <p:cNvSpPr/>
-          <p:nvPr/>
-        </p:nvSpPr>
-        <p:spPr>
-          <a:xfrm>
-            <a:off x="21323050" y="6772425"/>
-            <a:ext cx="7291800" cy="6556500"/>
-          </a:xfrm>
-          <a:prstGeom prst="verticalScroll">
-            <a:avLst>
-              <a:gd fmla="val 12500" name="adj"/>
-            </a:avLst>
-          </a:prstGeom>
+<file path=ppt/theme/theme1.xml><?xml version="1.0" encoding="utf-8"?>
+<a:theme xmlns:a="http://schemas.openxmlformats.org/drawingml/2006/main" xmlns:r="http://schemas.openxmlformats.org/officeDocument/2006/relationships" name="Simple Light">
+  <a:themeElements>
+    <a:clrScheme name="Simple Light">
+      <a:dk1>
+        <a:srgbClr val="000000"/>
+      </a:dk1>
+      <a:lt1>
+        <a:srgbClr val="FFFFFF"/>
+      </a:lt1>
+      <a:dk2>
+        <a:srgbClr val="595959"/>
+      </a:dk2>
+      <a:lt2>
+        <a:srgbClr val="EEEEEE"/>
+      </a:lt2>
+      <a:accent1>
+        <a:srgbClr val="4285F4"/>
+      </a:accent1>
+      <a:accent2>
+        <a:srgbClr val="212121"/>
+      </a:accent2>
+      <a:accent3>
+        <a:srgbClr val="78909C"/>
+      </a:accent3>
+      <a:accent4>
+        <a:srgbClr val="FFAB40"/>
+      </a:accent4>
+      <a:accent5>
+        <a:srgbClr val="0097A7"/>
+      </a:accent5>
+      <a:accent6>
+        <a:srgbClr val="EEFF41"/>
+      </a:accent6>
+      <a:hlink>
+        <a:srgbClr val="0097A7"/>
+      </a:hlink>
+      <a:folHlink>
+        <a:srgbClr val="0097A7"/>
+      </a:folHlink>
+    </a:clrScheme>
+    <a:fontScheme name="Office">
+      <a:majorFont>
+        <a:latin typeface="Arial"/>
+        <a:ea typeface=""/>
+        <a:cs typeface=""/>
+        <a:font script="Jpan" typeface="ＭＳ Ｐゴシック"/>
+        <a:font script="Hang" typeface="맑은 고딕"/>
+        <a:font script="Hans" typeface="宋体"/>
+        <a:font script="Hant" typeface="新細明體"/>
+        <a:font script="Arab" typeface="Times New Roman"/>
+        <a:font script="Hebr" typeface="Times New Roman"/>
+        <a:font script="Thai" typeface="Angsana New"/>
+        <a:font script="Ethi" typeface="Nyala"/>
+        <a:font script="Beng" typeface="Vrinda"/>
+        <a:font script="Gujr" typeface="Shruti"/>
+        <a:font script="Khmr" typeface="MoolBoran"/>
+        <a:font script="Knda" typeface="Tunga"/>
+        <a:font script="Guru" typeface="Raavi"/>
+        <a:font script="Cans" typeface="Euphemia"/>
+        <a:font script="Cher" typeface="Plantagenet Cherokee"/>
+        <a:font script="Yiii" typeface="Microsoft Yi Baiti"/>
+        <a:font script="Tibt" typeface="Microsoft Himalaya"/>
+        <a:font script="Thaa" typeface="MV Boli"/>
+        <a:font script="Deva" typeface="Mangal"/>
+        <a:font script="Telu" typeface="Gautami"/>
+        <a:font script="Taml" typeface="Latha"/>
+        <a:font script="Syrc" typeface="Estrangelo Edessa"/>
+        <a:font script="Orya" typeface="Kalinga"/>
+        <a:font script="Mlym" typeface="Kartika"/>
+        <a:font script="Laoo" typeface="DokChampa"/>
+        <a:font script="Sinh" typeface="Iskoola Pota"/>
+        <a:font script="Mong" typeface="Mongolian Baiti"/>
+        <a:font script="Viet" typeface="Times New Roman"/>
+        <a:font script="Uigh" typeface="Microsoft Uighur"/>
+        <a:font script="Geor" typeface="Sylfaen"/>
+      </a:majorFont>
+      <a:minorFont>
+        <a:latin typeface="Arial"/>
+        <a:ea typeface=""/>
+        <a:cs typeface=""/>
+        <a:font script="Jpan" typeface="ＭＳ Ｐゴシック"/>
+        <a:font script="Hang" typeface="맑은 고딕"/>
+        <a:font script="Hans" typeface="宋体"/>
+        <a:font script="Hant" typeface="新細明體"/>
+        <a:font script="Arab" typeface="Arial"/>
+        <a:font script="Hebr" typeface="Arial"/>
+        <a:font script="Thai" typeface="Cordia New"/>
+        <a:font script="Ethi" typeface="Nyala"/>
+        <a:font script="Beng" typeface="Vrinda"/>
+        <a:font script="Gujr" typeface="Shruti"/>
+        <a:font script="Khmr" typeface="DaunPenh"/>
+        <a:font script="Knda" typeface="Tunga"/>
+        <a:font script="Guru" typeface="Raavi"/>
+        <a:font script="Cans" typeface="Euphemia"/>
+        <a:font script="Cher" typeface="Plantagenet Cherokee"/>
+        <a:font script="Yiii" typeface="Microsoft Yi Baiti"/>
+        <a:font script="Tibt" typeface="Microsoft Himalaya"/>
+        <a:font script="Thaa" typeface="MV Boli"/>
+        <a:font script="Deva" typeface="Mangal"/>
+        <a:font script="Telu" typeface="Gautami"/>
+        <a:font script="Taml" typeface="Latha"/>
+        <a:font script="Syrc" typeface="Estrangelo Edessa"/>
+        <a:font script="Orya" typeface="Kalinga"/>
+        <a:font script="Mlym" typeface="Kartika"/>
+        <a:font script="Laoo" typeface="DokChampa"/>
+        <a:font script="Sinh" typeface="Iskoola Pota"/>
+        <a:font script="Mong" typeface="Mongolian Baiti"/>
+        <a:font script="Viet" typeface="Arial"/>
+        <a:font script="Uigh" typeface="Microsoft Uighur"/>
+        <a:font script="Geor" typeface="Sylfaen"/>
+      </a:minorFont>
+    </a:fontScheme>
+    <a:fmtScheme name="Office">
+      <a:fillStyleLst>
+        <a:solidFill>
+          <a:schemeClr val="phClr"/>
+        </a:solidFill>
+        <a:gradFill rotWithShape="1">
+          <a:gsLst>
+            <a:gs pos="0">
+              <a:schemeClr val="phClr">
+                <a:tint val="50000"/>
+                <a:satMod val="300000"/>
+              </a:schemeClr>
+            </a:gs>
+            <a:gs pos="35000">
+              <a:schemeClr val="phClr">
+                <a:tint val="37000"/>
+                <a:satMod val="300000"/>
+              </a:schemeClr>
+            </a:gs>
+            <a:gs pos="100000">
+              <a:schemeClr val="phClr">
+                <a:tint val="15000"/>
+                <a:satMod val="350000"/>
+              </a:schemeClr>
+            </a:gs>
+          </a:gsLst>
+          <a:lin ang="16200000" scaled="1"/>
+        </a:gradFill>
+        <a:gradFill rotWithShape="1">
+          <a:gsLst>
+            <a:gs pos="0">
+              <a:schemeClr val="phClr">
+                <a:tint val="100000"/>
+                <a:shade val="100000"/>
+                <a:satMod val="130000"/>
+              </a:schemeClr>
+            </a:gs>
+            <a:gs pos="100000">
+              <a:schemeClr val="phClr">
+                <a:tint val="50000"/>
+                <a:shade val="100000"/>
+                <a:satMod val="350000"/>
+              </a:schemeClr>
+            </a:gs>
+          </a:gsLst>
+          <a:lin ang="16200000" scaled="0"/>
+        </a:gradFill>
+      </a:fillStyleLst>
+      <a:lnStyleLst>
+        <a:ln w="9525" cap="flat" cmpd="sng" algn="ctr">
           <a:solidFill>
-            <a:srgbClr val="D4A373"/>
+            <a:schemeClr val="phClr">
+              <a:shade val="95000"/>
+              <a:satMod val="105000"/>
+            </a:schemeClr>
           </a:solidFill>
-          <a:ln cap="flat" cmpd="sng" w="9525">
-            <a:solidFill>
-              <a:schemeClr val="dk2"/>
-            </a:solidFill>
-            <a:prstDash val="solid"/>
-            <a:round/>
-            <a:headEnd len="sm" w="sm" type="none"/>
-            <a:tailEnd len="sm" w="sm" type="none"/>
-          </a:ln>
-        </p:spPr>
-        <p:txBody>
-          <a:bodyPr anchorCtr="0" anchor="t" bIns="91425" lIns="91425" spcFirstLastPara="1" rIns="91425" wrap="square" tIns="91425">
-            <a:noAutofit/>
-          </a:bodyPr>
-          <a:lstStyle/>
-          <a:p>
-            <a:pPr indent="0" lvl="0" marL="0" rtl="0" algn="ctr">
-              <a:spcBef>
-                <a:spcPts val="0"/>
-              </a:spcBef>
-              <a:spcAft>
-                <a:spcPts val="0"/>
-              </a:spcAft>
-              <a:buNone/>
-            </a:pPr>
-            <a:r>
-              <a:rPr lang="es" sz="3700">
-                <a:solidFill>
-                  <a:schemeClr val="dk1"/>
-                </a:solidFill>
-              </a:rPr>
-              <a:t>Manifiesto Ágil</a:t>
-            </a:r>
-            <a:endParaRPr sz="3700">
-              <a:solidFill>
-                <a:schemeClr val="dk1"/>
-              </a:solidFill>
-            </a:endParaRPr>
-          </a:p>
-          <a:p>
-            <a:pPr indent="0" lvl="0" marL="0" rtl="0" algn="l">
-              <a:spcBef>
-                <a:spcPts val="0"/>
-              </a:spcBef>
-              <a:spcAft>
-                <a:spcPts val="0"/>
-              </a:spcAft>
-              <a:buNone/>
-            </a:pPr>
-            <a:r>
-              <a:t/>
-            </a:r>
-            <a:endParaRPr sz="3700">
-              <a:solidFill>
-                <a:schemeClr val="dk1"/>
-              </a:solidFill>
-            </a:endParaRPr>
-          </a:p>
-          <a:p>
-            <a:pPr indent="-393700" lvl="0" marL="457200" rtl="0" algn="just">
-              <a:spcBef>
-                <a:spcPts val="0"/>
-              </a:spcBef>
-              <a:spcAft>
-                <a:spcPts val="0"/>
-              </a:spcAft>
-              <a:buClr>
-                <a:schemeClr val="dk1"/>
-              </a:buClr>
-              <a:buSzPts val="2600"/>
-              <a:buFont typeface="Merriweather"/>
-              <a:buChar char="●"/>
-            </a:pPr>
-            <a:r>
-              <a:rPr lang="es" sz="2600">
-                <a:solidFill>
-                  <a:schemeClr val="dk1"/>
-                </a:solidFill>
-                <a:latin typeface="Merriweather"/>
-                <a:ea typeface="Merriweather"/>
-                <a:cs typeface="Merriweather"/>
-                <a:sym typeface="Merriweather"/>
-              </a:rPr>
-              <a:t>Individuos e interacciones sobre procesos y herramientas</a:t>
-            </a:r>
-            <a:endParaRPr sz="2600">
-              <a:solidFill>
-                <a:schemeClr val="dk1"/>
-              </a:solidFill>
-              <a:latin typeface="Merriweather"/>
-              <a:ea typeface="Merriweather"/>
-              <a:cs typeface="Merriweather"/>
-              <a:sym typeface="Merriweather"/>
-            </a:endParaRPr>
-          </a:p>
-          <a:p>
-            <a:pPr indent="-393700" lvl="0" marL="457200" rtl="0" algn="just">
-              <a:spcBef>
-                <a:spcPts val="0"/>
-              </a:spcBef>
-              <a:spcAft>
-                <a:spcPts val="0"/>
-              </a:spcAft>
-              <a:buClr>
-                <a:schemeClr val="dk1"/>
-              </a:buClr>
-              <a:buSzPts val="2600"/>
-              <a:buFont typeface="Merriweather"/>
-              <a:buChar char="●"/>
-            </a:pPr>
-            <a:r>
-              <a:rPr lang="es" sz="2600">
-                <a:solidFill>
-                  <a:schemeClr val="dk1"/>
-                </a:solidFill>
-                <a:latin typeface="Merriweather"/>
-                <a:ea typeface="Merriweather"/>
-                <a:cs typeface="Merriweather"/>
-                <a:sym typeface="Merriweather"/>
-              </a:rPr>
-              <a:t>Software funcionando sobre documentación extensiva</a:t>
-            </a:r>
-            <a:endParaRPr sz="2600">
-              <a:solidFill>
-                <a:schemeClr val="dk1"/>
-              </a:solidFill>
-              <a:latin typeface="Merriweather"/>
-              <a:ea typeface="Merriweather"/>
-              <a:cs typeface="Merriweather"/>
-              <a:sym typeface="Merriweather"/>
-            </a:endParaRPr>
-          </a:p>
-          <a:p>
-            <a:pPr indent="-393700" lvl="0" marL="457200" rtl="0" algn="just">
-              <a:spcBef>
-                <a:spcPts val="0"/>
-              </a:spcBef>
-              <a:spcAft>
-                <a:spcPts val="0"/>
-              </a:spcAft>
-              <a:buClr>
-                <a:schemeClr val="dk1"/>
-              </a:buClr>
-              <a:buSzPts val="2600"/>
-              <a:buFont typeface="Merriweather"/>
-              <a:buChar char="●"/>
-            </a:pPr>
-            <a:r>
-              <a:rPr lang="es" sz="2600">
-                <a:solidFill>
-                  <a:schemeClr val="dk1"/>
-                </a:solidFill>
-                <a:latin typeface="Merriweather"/>
-                <a:ea typeface="Merriweather"/>
-                <a:cs typeface="Merriweather"/>
-                <a:sym typeface="Merriweather"/>
-              </a:rPr>
-              <a:t>Colaboración con el cliente sobre negociación contractual</a:t>
-            </a:r>
-            <a:endParaRPr sz="2600">
-              <a:solidFill>
-                <a:schemeClr val="dk1"/>
-              </a:solidFill>
-              <a:latin typeface="Merriweather"/>
-              <a:ea typeface="Merriweather"/>
-              <a:cs typeface="Merriweather"/>
-              <a:sym typeface="Merriweather"/>
-            </a:endParaRPr>
-          </a:p>
-          <a:p>
-            <a:pPr indent="-393700" lvl="0" marL="457200" rtl="0" algn="just">
-              <a:spcBef>
-                <a:spcPts val="0"/>
-              </a:spcBef>
-              <a:spcAft>
-                <a:spcPts val="0"/>
-              </a:spcAft>
-              <a:buClr>
-                <a:schemeClr val="dk1"/>
-              </a:buClr>
-              <a:buSzPts val="2600"/>
-              <a:buFont typeface="Merriweather"/>
-              <a:buChar char="●"/>
-            </a:pPr>
-            <a:r>
-              <a:rPr lang="es" sz="2600">
-                <a:solidFill>
-                  <a:schemeClr val="dk1"/>
-                </a:solidFill>
-                <a:latin typeface="Merriweather"/>
-                <a:ea typeface="Merriweather"/>
-                <a:cs typeface="Merriweather"/>
-                <a:sym typeface="Merriweather"/>
-              </a:rPr>
-              <a:t>Respuesta ante el cambio sobre seguir un plan</a:t>
-            </a:r>
-            <a:endParaRPr sz="2600">
-              <a:solidFill>
-                <a:schemeClr val="dk1"/>
-              </a:solidFill>
-            </a:endParaRPr>
-          </a:p>
-        </p:txBody>
-      </p:sp>
-    </p:spTree>
-  </p:cSld>
-  <p:clrMapOvr>
-    <a:masterClrMapping/>
-  </p:clrMapOvr>
-</p:sld>
+          <a:prstDash val="solid"/>
+        </a:ln>
+        <a:ln w="25400" cap="flat" cmpd="sng" algn="ctr">
+          <a:solidFill>
+            <a:schemeClr val="phClr"/>
+          </a:solidFill>
+          <a:prstDash val="solid"/>
+        </a:ln>
+        <a:ln w="38100" cap="flat" cmpd="sng" algn="ctr">
+          <a:solidFill>
+            <a:schemeClr val="phClr"/>
+          </a:solidFill>
+          <a:prstDash val="solid"/>
+        </a:ln>
+      </a:lnStyleLst>
+      <a:effectStyleLst>
+        <a:effectStyle>
+          <a:effectLst>
+            <a:outerShdw blurRad="40000" dist="20000" dir="5400000" rotWithShape="0">
+              <a:srgbClr val="000000">
+                <a:alpha val="38000"/>
+              </a:srgbClr>
+            </a:outerShdw>
+          </a:effectLst>
+        </a:effectStyle>
+        <a:effectStyle>
+          <a:effectLst>
+            <a:outerShdw blurRad="40000" dist="23000" dir="5400000" rotWithShape="0">
+              <a:srgbClr val="000000">
+                <a:alpha val="35000"/>
+              </a:srgbClr>
+            </a:outerShdw>
+          </a:effectLst>
+        </a:effectStyle>
+        <a:effectStyle>
+          <a:effectLst>
+            <a:outerShdw blurRad="40000" dist="23000" dir="5400000" rotWithShape="0">
+              <a:srgbClr val="000000">
+                <a:alpha val="35000"/>
+              </a:srgbClr>
+            </a:outerShdw>
+          </a:effectLst>
+          <a:scene3d>
+            <a:camera prst="orthographicFront">
+              <a:rot lat="0" lon="0" rev="0"/>
+            </a:camera>
+            <a:lightRig rig="threePt" dir="t">
+              <a:rot lat="0" lon="0" rev="1200000"/>
+            </a:lightRig>
+          </a:scene3d>
+          <a:sp3d>
+            <a:bevelT w="63500" h="25400"/>
+          </a:sp3d>
+        </a:effectStyle>
+      </a:effectStyleLst>
+      <a:bgFillStyleLst>
+        <a:solidFill>
+          <a:schemeClr val="phClr"/>
+        </a:solidFill>
+        <a:gradFill rotWithShape="1">
+          <a:gsLst>
+            <a:gs pos="0">
+              <a:schemeClr val="phClr">
+                <a:tint val="40000"/>
+                <a:satMod val="350000"/>
+              </a:schemeClr>
+            </a:gs>
+            <a:gs pos="40000">
+              <a:schemeClr val="phClr">
+                <a:tint val="45000"/>
+                <a:shade val="99000"/>
+                <a:satMod val="350000"/>
+              </a:schemeClr>
+            </a:gs>
+            <a:gs pos="100000">
+              <a:schemeClr val="phClr">
+                <a:shade val="20000"/>
+                <a:satMod val="255000"/>
+              </a:schemeClr>
+            </a:gs>
+          </a:gsLst>
+          <a:path path="circle">
+            <a:fillToRect l="50000" t="-80000" r="50000" b="180000"/>
+          </a:path>
+        </a:gradFill>
+        <a:gradFill rotWithShape="1">
+          <a:gsLst>
+            <a:gs pos="0">
+              <a:schemeClr val="phClr">
+                <a:tint val="80000"/>
+                <a:satMod val="300000"/>
+              </a:schemeClr>
+            </a:gs>
+            <a:gs pos="100000">
+              <a:schemeClr val="phClr">
+                <a:shade val="30000"/>
+                <a:satMod val="200000"/>
+              </a:schemeClr>
+            </a:gs>
+          </a:gsLst>
+          <a:path path="circle">
+            <a:fillToRect l="50000" t="50000" r="50000" b="50000"/>
+          </a:path>
+        </a:gradFill>
+      </a:bgFillStyleLst>
+    </a:fmtScheme>
+  </a:themeElements>
+</a:theme>
 </file>
 
-<file path=ppt/theme/theme1.xml><?xml version="1.0" encoding="utf-8"?>
+<file path=ppt/theme/theme2.xml><?xml version="1.0" encoding="utf-8"?>
 <a:theme xmlns:a="http://schemas.openxmlformats.org/drawingml/2006/main" xmlns:r="http://schemas.openxmlformats.org/officeDocument/2006/relationships">
   <a:themeElements>
     <a:clrScheme name="Default">
@@ -10943,283 +10683,4 @@
     </a:fmtScheme>
   </a:themeElements>
 </a:theme>
-</file>
-
-<file path=ppt/theme/theme2.xml><?xml version="1.0" encoding="utf-8"?>
-<a:theme xmlns:a="http://schemas.openxmlformats.org/drawingml/2006/main" xmlns:r="http://schemas.openxmlformats.org/officeDocument/2006/relationships" name="Simple Light">
-  <a:themeElements>
-    <a:clrScheme name="Simple Light">
-      <a:dk1>
-        <a:srgbClr val="000000"/>
-      </a:dk1>
-      <a:lt1>
-        <a:srgbClr val="FFFFFF"/>
-      </a:lt1>
-      <a:dk2>
-        <a:srgbClr val="595959"/>
-      </a:dk2>
-      <a:lt2>
-        <a:srgbClr val="EEEEEE"/>
-      </a:lt2>
-      <a:accent1>
-        <a:srgbClr val="4285F4"/>
-      </a:accent1>
-      <a:accent2>
-        <a:srgbClr val="212121"/>
-      </a:accent2>
-      <a:accent3>
-        <a:srgbClr val="78909C"/>
-      </a:accent3>
-      <a:accent4>
-        <a:srgbClr val="FFAB40"/>
-      </a:accent4>
-      <a:accent5>
-        <a:srgbClr val="0097A7"/>
-      </a:accent5>
-      <a:accent6>
-        <a:srgbClr val="EEFF41"/>
-      </a:accent6>
-      <a:hlink>
-        <a:srgbClr val="0097A7"/>
-      </a:hlink>
-      <a:folHlink>
-        <a:srgbClr val="0097A7"/>
-      </a:folHlink>
-    </a:clrScheme>
-    <a:fontScheme name="Office">
-      <a:majorFont>
-        <a:latin typeface="Arial"/>
-        <a:ea typeface=""/>
-        <a:cs typeface=""/>
-        <a:font script="Jpan" typeface="ＭＳ Ｐゴシック"/>
-        <a:font script="Hang" typeface="맑은 고딕"/>
-        <a:font script="Hans" typeface="宋体"/>
-        <a:font script="Hant" typeface="新細明體"/>
-        <a:font script="Arab" typeface="Times New Roman"/>
-        <a:font script="Hebr" typeface="Times New Roman"/>
-        <a:font script="Thai" typeface="Angsana New"/>
-        <a:font script="Ethi" typeface="Nyala"/>
-        <a:font script="Beng" typeface="Vrinda"/>
-        <a:font script="Gujr" typeface="Shruti"/>
-        <a:font script="Khmr" typeface="MoolBoran"/>
-        <a:font script="Knda" typeface="Tunga"/>
-        <a:font script="Guru" typeface="Raavi"/>
-        <a:font script="Cans" typeface="Euphemia"/>
-        <a:font script="Cher" typeface="Plantagenet Cherokee"/>
-        <a:font script="Yiii" typeface="Microsoft Yi Baiti"/>
-        <a:font script="Tibt" typeface="Microsoft Himalaya"/>
-        <a:font script="Thaa" typeface="MV Boli"/>
-        <a:font script="Deva" typeface="Mangal"/>
-        <a:font script="Telu" typeface="Gautami"/>
-        <a:font script="Taml" typeface="Latha"/>
-        <a:font script="Syrc" typeface="Estrangelo Edessa"/>
-        <a:font script="Orya" typeface="Kalinga"/>
-        <a:font script="Mlym" typeface="Kartika"/>
-        <a:font script="Laoo" typeface="DokChampa"/>
-        <a:font script="Sinh" typeface="Iskoola Pota"/>
-        <a:font script="Mong" typeface="Mongolian Baiti"/>
-        <a:font script="Viet" typeface="Times New Roman"/>
-        <a:font script="Uigh" typeface="Microsoft Uighur"/>
-        <a:font script="Geor" typeface="Sylfaen"/>
-      </a:majorFont>
-      <a:minorFont>
-        <a:latin typeface="Arial"/>
-        <a:ea typeface=""/>
-        <a:cs typeface=""/>
-        <a:font script="Jpan" typeface="ＭＳ Ｐゴシック"/>
-        <a:font script="Hang" typeface="맑은 고딕"/>
-        <a:font script="Hans" typeface="宋体"/>
-        <a:font script="Hant" typeface="新細明體"/>
-        <a:font script="Arab" typeface="Arial"/>
-        <a:font script="Hebr" typeface="Arial"/>
-        <a:font script="Thai" typeface="Cordia New"/>
-        <a:font script="Ethi" typeface="Nyala"/>
-        <a:font script="Beng" typeface="Vrinda"/>
-        <a:font script="Gujr" typeface="Shruti"/>
-        <a:font script="Khmr" typeface="DaunPenh"/>
-        <a:font script="Knda" typeface="Tunga"/>
-        <a:font script="Guru" typeface="Raavi"/>
-        <a:font script="Cans" typeface="Euphemia"/>
-        <a:font script="Cher" typeface="Plantagenet Cherokee"/>
-        <a:font script="Yiii" typeface="Microsoft Yi Baiti"/>
-        <a:font script="Tibt" typeface="Microsoft Himalaya"/>
-        <a:font script="Thaa" typeface="MV Boli"/>
-        <a:font script="Deva" typeface="Mangal"/>
-        <a:font script="Telu" typeface="Gautami"/>
-        <a:font script="Taml" typeface="Latha"/>
-        <a:font script="Syrc" typeface="Estrangelo Edessa"/>
-        <a:font script="Orya" typeface="Kalinga"/>
-        <a:font script="Mlym" typeface="Kartika"/>
-        <a:font script="Laoo" typeface="DokChampa"/>
-        <a:font script="Sinh" typeface="Iskoola Pota"/>
-        <a:font script="Mong" typeface="Mongolian Baiti"/>
-        <a:font script="Viet" typeface="Arial"/>
-        <a:font script="Uigh" typeface="Microsoft Uighur"/>
-        <a:font script="Geor" typeface="Sylfaen"/>
-      </a:minorFont>
-    </a:fontScheme>
-    <a:fmtScheme name="Office">
-      <a:fillStyleLst>
-        <a:solidFill>
-          <a:schemeClr val="phClr"/>
-        </a:solidFill>
-        <a:gradFill rotWithShape="1">
-          <a:gsLst>
-            <a:gs pos="0">
-              <a:schemeClr val="phClr">
-                <a:tint val="50000"/>
-                <a:satMod val="300000"/>
-              </a:schemeClr>
-            </a:gs>
-            <a:gs pos="35000">
-              <a:schemeClr val="phClr">
-                <a:tint val="37000"/>
-                <a:satMod val="300000"/>
-              </a:schemeClr>
-            </a:gs>
-            <a:gs pos="100000">
-              <a:schemeClr val="phClr">
-                <a:tint val="15000"/>
-                <a:satMod val="350000"/>
-              </a:schemeClr>
-            </a:gs>
-          </a:gsLst>
-          <a:lin ang="16200000" scaled="1"/>
-        </a:gradFill>
-        <a:gradFill rotWithShape="1">
-          <a:gsLst>
-            <a:gs pos="0">
-              <a:schemeClr val="phClr">
-                <a:tint val="100000"/>
-                <a:shade val="100000"/>
-                <a:satMod val="130000"/>
-              </a:schemeClr>
-            </a:gs>
-            <a:gs pos="100000">
-              <a:schemeClr val="phClr">
-                <a:tint val="50000"/>
-                <a:shade val="100000"/>
-                <a:satMod val="350000"/>
-              </a:schemeClr>
-            </a:gs>
-          </a:gsLst>
-          <a:lin ang="16200000" scaled="0"/>
-        </a:gradFill>
-      </a:fillStyleLst>
-      <a:lnStyleLst>
-        <a:ln w="9525" cap="flat" cmpd="sng" algn="ctr">
-          <a:solidFill>
-            <a:schemeClr val="phClr">
-              <a:shade val="95000"/>
-              <a:satMod val="105000"/>
-            </a:schemeClr>
-          </a:solidFill>
-          <a:prstDash val="solid"/>
-        </a:ln>
-        <a:ln w="25400" cap="flat" cmpd="sng" algn="ctr">
-          <a:solidFill>
-            <a:schemeClr val="phClr"/>
-          </a:solidFill>
-          <a:prstDash val="solid"/>
-        </a:ln>
-        <a:ln w="38100" cap="flat" cmpd="sng" algn="ctr">
-          <a:solidFill>
-            <a:schemeClr val="phClr"/>
-          </a:solidFill>
-          <a:prstDash val="solid"/>
-        </a:ln>
-      </a:lnStyleLst>
-      <a:effectStyleLst>
-        <a:effectStyle>
-          <a:effectLst>
-            <a:outerShdw blurRad="40000" dist="20000" dir="5400000" rotWithShape="0">
-              <a:srgbClr val="000000">
-                <a:alpha val="38000"/>
-              </a:srgbClr>
-            </a:outerShdw>
-          </a:effectLst>
-        </a:effectStyle>
-        <a:effectStyle>
-          <a:effectLst>
-            <a:outerShdw blurRad="40000" dist="23000" dir="5400000" rotWithShape="0">
-              <a:srgbClr val="000000">
-                <a:alpha val="35000"/>
-              </a:srgbClr>
-            </a:outerShdw>
-          </a:effectLst>
-        </a:effectStyle>
-        <a:effectStyle>
-          <a:effectLst>
-            <a:outerShdw blurRad="40000" dist="23000" dir="5400000" rotWithShape="0">
-              <a:srgbClr val="000000">
-                <a:alpha val="35000"/>
-              </a:srgbClr>
-            </a:outerShdw>
-          </a:effectLst>
-          <a:scene3d>
-            <a:camera prst="orthographicFront">
-              <a:rot lat="0" lon="0" rev="0"/>
-            </a:camera>
-            <a:lightRig rig="threePt" dir="t">
-              <a:rot lat="0" lon="0" rev="1200000"/>
-            </a:lightRig>
-          </a:scene3d>
-          <a:sp3d>
-            <a:bevelT w="63500" h="25400"/>
-          </a:sp3d>
-        </a:effectStyle>
-      </a:effectStyleLst>
-      <a:bgFillStyleLst>
-        <a:solidFill>
-          <a:schemeClr val="phClr"/>
-        </a:solidFill>
-        <a:gradFill rotWithShape="1">
-          <a:gsLst>
-            <a:gs pos="0">
-              <a:schemeClr val="phClr">
-                <a:tint val="40000"/>
-                <a:satMod val="350000"/>
-              </a:schemeClr>
-            </a:gs>
-            <a:gs pos="40000">
-              <a:schemeClr val="phClr">
-                <a:tint val="45000"/>
-                <a:shade val="99000"/>
-                <a:satMod val="350000"/>
-              </a:schemeClr>
-            </a:gs>
-            <a:gs pos="100000">
-              <a:schemeClr val="phClr">
-                <a:shade val="20000"/>
-                <a:satMod val="255000"/>
-              </a:schemeClr>
-            </a:gs>
-          </a:gsLst>
-          <a:path path="circle">
-            <a:fillToRect l="50000" t="-80000" r="50000" b="180000"/>
-          </a:path>
-        </a:gradFill>
-        <a:gradFill rotWithShape="1">
-          <a:gsLst>
-            <a:gs pos="0">
-              <a:schemeClr val="phClr">
-                <a:tint val="80000"/>
-                <a:satMod val="300000"/>
-              </a:schemeClr>
-            </a:gs>
-            <a:gs pos="100000">
-              <a:schemeClr val="phClr">
-                <a:shade val="30000"/>
-                <a:satMod val="200000"/>
-              </a:schemeClr>
-            </a:gs>
-          </a:gsLst>
-          <a:path path="circle">
-            <a:fillToRect l="50000" t="50000" r="50000" b="50000"/>
-          </a:path>
-        </a:gradFill>
-      </a:bgFillStyleLst>
-    </a:fmtScheme>
-  </a:themeElements>
-</a:theme>
 </file>
</xml_diff>